<commit_message>
added graph of distractors occurences and success
</commit_message>
<xml_diff>
--- a/docs/pilot 1 results.pptx
+++ b/docs/pilot 1 results.pptx
@@ -10,6 +10,7 @@
     <p:sldId id="258" r:id="rId4"/>
     <p:sldId id="259" r:id="rId5"/>
     <p:sldId id="260" r:id="rId6"/>
+    <p:sldId id="261" r:id="rId7"/>
   </p:sldIdLst>
   <p:sldSz cx="12192000" cy="6858000"/>
   <p:notesSz cx="6858000" cy="9144000"/>
@@ -108,6 +109,11 @@
       </a:defRPr>
     </a:lvl9pPr>
   </p:defaultTextStyle>
+  <p:extLst>
+    <p:ext uri="{EFAFB233-063F-42B5-8137-9DF3F51BA10A}">
+      <p15:sldGuideLst xmlns:p15="http://schemas.microsoft.com/office/powerpoint/2012/main"/>
+    </p:ext>
+  </p:extLst>
 </p:presentation>
 </file>
 
@@ -4359,6 +4365,104 @@
 </p:sld>
 </file>
 
+<file path=ppt/slides/slide6.xml><?xml version="1.0" encoding="utf-8"?>
+<p:sld xmlns:a="http://schemas.openxmlformats.org/drawingml/2006/main" xmlns:r="http://schemas.openxmlformats.org/officeDocument/2006/relationships" xmlns:p="http://schemas.openxmlformats.org/presentationml/2006/main">
+  <p:cSld>
+    <p:spTree>
+      <p:nvGrpSpPr>
+        <p:cNvPr id="1" name=""/>
+        <p:cNvGrpSpPr/>
+        <p:nvPr/>
+      </p:nvGrpSpPr>
+      <p:grpSpPr>
+        <a:xfrm>
+          <a:off x="0" y="0"/>
+          <a:ext cx="0" cy="0"/>
+          <a:chOff x="0" y="0"/>
+          <a:chExt cx="0" cy="0"/>
+        </a:xfrm>
+      </p:grpSpPr>
+      <p:sp>
+        <p:nvSpPr>
+          <p:cNvPr id="2" name="Title 1">
+            <a:extLst>
+              <a:ext uri="{FF2B5EF4-FFF2-40B4-BE49-F238E27FC236}">
+                <a16:creationId xmlns:a16="http://schemas.microsoft.com/office/drawing/2014/main" id="{9D9D7E9E-BDAB-60D3-BD56-EB83EC72A9DB}"/>
+              </a:ext>
+            </a:extLst>
+          </p:cNvPr>
+          <p:cNvSpPr>
+            <a:spLocks noGrp="1"/>
+          </p:cNvSpPr>
+          <p:nvPr>
+            <p:ph type="title"/>
+          </p:nvPr>
+        </p:nvSpPr>
+        <p:spPr>
+          <a:xfrm>
+            <a:off x="341050" y="220353"/>
+            <a:ext cx="11004612" cy="1325563"/>
+          </a:xfrm>
+        </p:spPr>
+        <p:txBody>
+          <a:bodyPr/>
+          <a:lstStyle/>
+          <a:p>
+            <a:r>
+              <a:rPr lang="en-US" dirty="0"/>
+              <a:t>Should we replace any of the 60 target images? </a:t>
+            </a:r>
+          </a:p>
+        </p:txBody>
+      </p:sp>
+      <p:pic>
+        <p:nvPicPr>
+          <p:cNvPr id="5" name="Content Placeholder 4" descr="Chart, bar chart, line chart&#10;&#10;Description automatically generated">
+            <a:extLst>
+              <a:ext uri="{FF2B5EF4-FFF2-40B4-BE49-F238E27FC236}">
+                <a16:creationId xmlns:a16="http://schemas.microsoft.com/office/drawing/2014/main" id="{BD8F7933-62A4-C265-9A94-E46B7677265D}"/>
+              </a:ext>
+            </a:extLst>
+          </p:cNvPr>
+          <p:cNvPicPr>
+            <a:picLocks noGrp="1" noChangeAspect="1"/>
+          </p:cNvPicPr>
+          <p:nvPr>
+            <p:ph idx="1"/>
+          </p:nvPr>
+        </p:nvPicPr>
+        <p:blipFill>
+          <a:blip r:embed="rId2">
+            <a:extLst>
+              <a:ext uri="{28A0092B-C50C-407E-A947-70E740481C1C}">
+                <a14:useLocalDpi xmlns:a14="http://schemas.microsoft.com/office/drawing/2010/main" val="0"/>
+              </a:ext>
+            </a:extLst>
+          </a:blip>
+          <a:stretch>
+            <a:fillRect/>
+          </a:stretch>
+        </p:blipFill>
+        <p:spPr>
+          <a:xfrm>
+            <a:off x="341050" y="1545916"/>
+            <a:ext cx="7283305" cy="4946959"/>
+          </a:xfrm>
+        </p:spPr>
+      </p:pic>
+    </p:spTree>
+    <p:extLst>
+      <p:ext uri="{BB962C8B-B14F-4D97-AF65-F5344CB8AC3E}">
+        <p14:creationId xmlns:p14="http://schemas.microsoft.com/office/powerpoint/2010/main" val="3771519013"/>
+      </p:ext>
+    </p:extLst>
+  </p:cSld>
+  <p:clrMapOvr>
+    <a:masterClrMapping/>
+  </p:clrMapOvr>
+</p:sld>
+</file>
+
 <file path=ppt/theme/theme1.xml><?xml version="1.0" encoding="utf-8"?>
 <a:theme xmlns:a="http://schemas.openxmlformats.org/drawingml/2006/main" name="Office Theme">
   <a:themeElements>

</xml_diff>

<commit_message>
Add csv files and docs pptx
</commit_message>
<xml_diff>
--- a/docs/pilot 1 results.pptx
+++ b/docs/pilot 1 results.pptx
@@ -4,6 +4,9 @@
   <p:sldMasterIdLst>
     <p:sldMasterId id="2147483648" r:id="rId1"/>
   </p:sldMasterIdLst>
+  <p:notesMasterIdLst>
+    <p:notesMasterId r:id="rId18"/>
+  </p:notesMasterIdLst>
   <p:sldIdLst>
     <p:sldId id="256" r:id="rId2"/>
     <p:sldId id="257" r:id="rId3"/>
@@ -11,6 +14,16 @@
     <p:sldId id="259" r:id="rId5"/>
     <p:sldId id="260" r:id="rId6"/>
     <p:sldId id="261" r:id="rId7"/>
+    <p:sldId id="262" r:id="rId8"/>
+    <p:sldId id="263" r:id="rId9"/>
+    <p:sldId id="264" r:id="rId10"/>
+    <p:sldId id="265" r:id="rId11"/>
+    <p:sldId id="268" r:id="rId12"/>
+    <p:sldId id="266" r:id="rId13"/>
+    <p:sldId id="267" r:id="rId14"/>
+    <p:sldId id="269" r:id="rId15"/>
+    <p:sldId id="270" r:id="rId16"/>
+    <p:sldId id="271" r:id="rId17"/>
   </p:sldIdLst>
   <p:sldSz cx="12192000" cy="6858000"/>
   <p:notesSz cx="6858000" cy="9144000"/>
@@ -117,6 +130,532 @@
 </p:presentation>
 </file>
 
+<file path=ppt/notesMasters/notesMaster1.xml><?xml version="1.0" encoding="utf-8"?>
+<p:notesMaster xmlns:a="http://schemas.openxmlformats.org/drawingml/2006/main" xmlns:r="http://schemas.openxmlformats.org/officeDocument/2006/relationships" xmlns:p="http://schemas.openxmlformats.org/presentationml/2006/main">
+  <p:cSld>
+    <p:bg>
+      <p:bgRef idx="1001">
+        <a:schemeClr val="bg1"/>
+      </p:bgRef>
+    </p:bg>
+    <p:spTree>
+      <p:nvGrpSpPr>
+        <p:cNvPr id="1" name=""/>
+        <p:cNvGrpSpPr/>
+        <p:nvPr/>
+      </p:nvGrpSpPr>
+      <p:grpSpPr>
+        <a:xfrm>
+          <a:off x="0" y="0"/>
+          <a:ext cx="0" cy="0"/>
+          <a:chOff x="0" y="0"/>
+          <a:chExt cx="0" cy="0"/>
+        </a:xfrm>
+      </p:grpSpPr>
+      <p:sp>
+        <p:nvSpPr>
+          <p:cNvPr id="2" name="Header Placeholder 1"/>
+          <p:cNvSpPr>
+            <a:spLocks noGrp="1"/>
+          </p:cNvSpPr>
+          <p:nvPr>
+            <p:ph type="hdr" sz="quarter"/>
+          </p:nvPr>
+        </p:nvSpPr>
+        <p:spPr>
+          <a:xfrm>
+            <a:off x="0" y="0"/>
+            <a:ext cx="2971800" cy="458788"/>
+          </a:xfrm>
+          <a:prstGeom prst="rect">
+            <a:avLst/>
+          </a:prstGeom>
+        </p:spPr>
+        <p:txBody>
+          <a:bodyPr vert="horz" lIns="91440" tIns="45720" rIns="91440" bIns="45720" rtlCol="0"/>
+          <a:lstStyle>
+            <a:lvl1pPr algn="l">
+              <a:defRPr sz="1200"/>
+            </a:lvl1pPr>
+          </a:lstStyle>
+          <a:p>
+            <a:endParaRPr lang="en-US"/>
+          </a:p>
+        </p:txBody>
+      </p:sp>
+      <p:sp>
+        <p:nvSpPr>
+          <p:cNvPr id="3" name="Date Placeholder 2"/>
+          <p:cNvSpPr>
+            <a:spLocks noGrp="1"/>
+          </p:cNvSpPr>
+          <p:nvPr>
+            <p:ph type="dt" idx="1"/>
+          </p:nvPr>
+        </p:nvSpPr>
+        <p:spPr>
+          <a:xfrm>
+            <a:off x="3884613" y="0"/>
+            <a:ext cx="2971800" cy="458788"/>
+          </a:xfrm>
+          <a:prstGeom prst="rect">
+            <a:avLst/>
+          </a:prstGeom>
+        </p:spPr>
+        <p:txBody>
+          <a:bodyPr vert="horz" lIns="91440" tIns="45720" rIns="91440" bIns="45720" rtlCol="0"/>
+          <a:lstStyle>
+            <a:lvl1pPr algn="r">
+              <a:defRPr sz="1200"/>
+            </a:lvl1pPr>
+          </a:lstStyle>
+          <a:p>
+            <a:fld id="{330A2EB3-6612-4841-AA96-937F51850030}" type="datetimeFigureOut">
+              <a:rPr lang="en-US" smtClean="0"/>
+              <a:t>10/23/2022</a:t>
+            </a:fld>
+            <a:endParaRPr lang="en-US"/>
+          </a:p>
+        </p:txBody>
+      </p:sp>
+      <p:sp>
+        <p:nvSpPr>
+          <p:cNvPr id="4" name="Slide Image Placeholder 3"/>
+          <p:cNvSpPr>
+            <a:spLocks noGrp="1" noRot="1" noChangeAspect="1"/>
+          </p:cNvSpPr>
+          <p:nvPr>
+            <p:ph type="sldImg" idx="2"/>
+          </p:nvPr>
+        </p:nvSpPr>
+        <p:spPr>
+          <a:xfrm>
+            <a:off x="685800" y="1143000"/>
+            <a:ext cx="5486400" cy="3086100"/>
+          </a:xfrm>
+          <a:prstGeom prst="rect">
+            <a:avLst/>
+          </a:prstGeom>
+          <a:noFill/>
+          <a:ln w="12700">
+            <a:solidFill>
+              <a:prstClr val="black"/>
+            </a:solidFill>
+          </a:ln>
+        </p:spPr>
+        <p:txBody>
+          <a:bodyPr vert="horz" lIns="91440" tIns="45720" rIns="91440" bIns="45720" rtlCol="0" anchor="ctr"/>
+          <a:lstStyle/>
+          <a:p>
+            <a:endParaRPr lang="en-US"/>
+          </a:p>
+        </p:txBody>
+      </p:sp>
+      <p:sp>
+        <p:nvSpPr>
+          <p:cNvPr id="5" name="Notes Placeholder 4"/>
+          <p:cNvSpPr>
+            <a:spLocks noGrp="1"/>
+          </p:cNvSpPr>
+          <p:nvPr>
+            <p:ph type="body" sz="quarter" idx="3"/>
+          </p:nvPr>
+        </p:nvSpPr>
+        <p:spPr>
+          <a:xfrm>
+            <a:off x="685800" y="4400550"/>
+            <a:ext cx="5486400" cy="3600450"/>
+          </a:xfrm>
+          <a:prstGeom prst="rect">
+            <a:avLst/>
+          </a:prstGeom>
+        </p:spPr>
+        <p:txBody>
+          <a:bodyPr vert="horz" lIns="91440" tIns="45720" rIns="91440" bIns="45720" rtlCol="0"/>
+          <a:lstStyle/>
+          <a:p>
+            <a:pPr lvl="0"/>
+            <a:r>
+              <a:rPr lang="en-US"/>
+              <a:t>Click to edit Master text styles</a:t>
+            </a:r>
+          </a:p>
+          <a:p>
+            <a:pPr lvl="1"/>
+            <a:r>
+              <a:rPr lang="en-US"/>
+              <a:t>Second level</a:t>
+            </a:r>
+          </a:p>
+          <a:p>
+            <a:pPr lvl="2"/>
+            <a:r>
+              <a:rPr lang="en-US"/>
+              <a:t>Third level</a:t>
+            </a:r>
+          </a:p>
+          <a:p>
+            <a:pPr lvl="3"/>
+            <a:r>
+              <a:rPr lang="en-US"/>
+              <a:t>Fourth level</a:t>
+            </a:r>
+          </a:p>
+          <a:p>
+            <a:pPr lvl="4"/>
+            <a:r>
+              <a:rPr lang="en-US"/>
+              <a:t>Fifth level</a:t>
+            </a:r>
+          </a:p>
+        </p:txBody>
+      </p:sp>
+      <p:sp>
+        <p:nvSpPr>
+          <p:cNvPr id="6" name="Footer Placeholder 5"/>
+          <p:cNvSpPr>
+            <a:spLocks noGrp="1"/>
+          </p:cNvSpPr>
+          <p:nvPr>
+            <p:ph type="ftr" sz="quarter" idx="4"/>
+          </p:nvPr>
+        </p:nvSpPr>
+        <p:spPr>
+          <a:xfrm>
+            <a:off x="0" y="8685213"/>
+            <a:ext cx="2971800" cy="458787"/>
+          </a:xfrm>
+          <a:prstGeom prst="rect">
+            <a:avLst/>
+          </a:prstGeom>
+        </p:spPr>
+        <p:txBody>
+          <a:bodyPr vert="horz" lIns="91440" tIns="45720" rIns="91440" bIns="45720" rtlCol="0" anchor="b"/>
+          <a:lstStyle>
+            <a:lvl1pPr algn="l">
+              <a:defRPr sz="1200"/>
+            </a:lvl1pPr>
+          </a:lstStyle>
+          <a:p>
+            <a:endParaRPr lang="en-US"/>
+          </a:p>
+        </p:txBody>
+      </p:sp>
+      <p:sp>
+        <p:nvSpPr>
+          <p:cNvPr id="7" name="Slide Number Placeholder 6"/>
+          <p:cNvSpPr>
+            <a:spLocks noGrp="1"/>
+          </p:cNvSpPr>
+          <p:nvPr>
+            <p:ph type="sldNum" sz="quarter" idx="5"/>
+          </p:nvPr>
+        </p:nvSpPr>
+        <p:spPr>
+          <a:xfrm>
+            <a:off x="3884613" y="8685213"/>
+            <a:ext cx="2971800" cy="458787"/>
+          </a:xfrm>
+          <a:prstGeom prst="rect">
+            <a:avLst/>
+          </a:prstGeom>
+        </p:spPr>
+        <p:txBody>
+          <a:bodyPr vert="horz" lIns="91440" tIns="45720" rIns="91440" bIns="45720" rtlCol="0" anchor="b"/>
+          <a:lstStyle>
+            <a:lvl1pPr algn="r">
+              <a:defRPr sz="1200"/>
+            </a:lvl1pPr>
+          </a:lstStyle>
+          <a:p>
+            <a:fld id="{C47F5BE4-EC01-47CF-85A1-260D51F7AD26}" type="slidenum">
+              <a:rPr lang="en-US" smtClean="0"/>
+              <a:t>‹#›</a:t>
+            </a:fld>
+            <a:endParaRPr lang="en-US"/>
+          </a:p>
+        </p:txBody>
+      </p:sp>
+    </p:spTree>
+    <p:extLst>
+      <p:ext uri="{BB962C8B-B14F-4D97-AF65-F5344CB8AC3E}">
+        <p14:creationId xmlns:p14="http://schemas.microsoft.com/office/powerpoint/2010/main" val="1350291085"/>
+      </p:ext>
+    </p:extLst>
+  </p:cSld>
+  <p:clrMap bg1="lt1" tx1="dk1" bg2="lt2" tx2="dk2" accent1="accent1" accent2="accent2" accent3="accent3" accent4="accent4" accent5="accent5" accent6="accent6" hlink="hlink" folHlink="folHlink"/>
+  <p:notesStyle>
+    <a:lvl1pPr marL="0" algn="l" defTabSz="914400" rtl="0" eaLnBrk="1" latinLnBrk="0" hangingPunct="1">
+      <a:defRPr sz="1200" kern="1200">
+        <a:solidFill>
+          <a:schemeClr val="tx1"/>
+        </a:solidFill>
+        <a:latin typeface="+mn-lt"/>
+        <a:ea typeface="+mn-ea"/>
+        <a:cs typeface="+mn-cs"/>
+      </a:defRPr>
+    </a:lvl1pPr>
+    <a:lvl2pPr marL="457200" algn="l" defTabSz="914400" rtl="0" eaLnBrk="1" latinLnBrk="0" hangingPunct="1">
+      <a:defRPr sz="1200" kern="1200">
+        <a:solidFill>
+          <a:schemeClr val="tx1"/>
+        </a:solidFill>
+        <a:latin typeface="+mn-lt"/>
+        <a:ea typeface="+mn-ea"/>
+        <a:cs typeface="+mn-cs"/>
+      </a:defRPr>
+    </a:lvl2pPr>
+    <a:lvl3pPr marL="914400" algn="l" defTabSz="914400" rtl="0" eaLnBrk="1" latinLnBrk="0" hangingPunct="1">
+      <a:defRPr sz="1200" kern="1200">
+        <a:solidFill>
+          <a:schemeClr val="tx1"/>
+        </a:solidFill>
+        <a:latin typeface="+mn-lt"/>
+        <a:ea typeface="+mn-ea"/>
+        <a:cs typeface="+mn-cs"/>
+      </a:defRPr>
+    </a:lvl3pPr>
+    <a:lvl4pPr marL="1371600" algn="l" defTabSz="914400" rtl="0" eaLnBrk="1" latinLnBrk="0" hangingPunct="1">
+      <a:defRPr sz="1200" kern="1200">
+        <a:solidFill>
+          <a:schemeClr val="tx1"/>
+        </a:solidFill>
+        <a:latin typeface="+mn-lt"/>
+        <a:ea typeface="+mn-ea"/>
+        <a:cs typeface="+mn-cs"/>
+      </a:defRPr>
+    </a:lvl4pPr>
+    <a:lvl5pPr marL="1828800" algn="l" defTabSz="914400" rtl="0" eaLnBrk="1" latinLnBrk="0" hangingPunct="1">
+      <a:defRPr sz="1200" kern="1200">
+        <a:solidFill>
+          <a:schemeClr val="tx1"/>
+        </a:solidFill>
+        <a:latin typeface="+mn-lt"/>
+        <a:ea typeface="+mn-ea"/>
+        <a:cs typeface="+mn-cs"/>
+      </a:defRPr>
+    </a:lvl5pPr>
+    <a:lvl6pPr marL="2286000" algn="l" defTabSz="914400" rtl="0" eaLnBrk="1" latinLnBrk="0" hangingPunct="1">
+      <a:defRPr sz="1200" kern="1200">
+        <a:solidFill>
+          <a:schemeClr val="tx1"/>
+        </a:solidFill>
+        <a:latin typeface="+mn-lt"/>
+        <a:ea typeface="+mn-ea"/>
+        <a:cs typeface="+mn-cs"/>
+      </a:defRPr>
+    </a:lvl6pPr>
+    <a:lvl7pPr marL="2743200" algn="l" defTabSz="914400" rtl="0" eaLnBrk="1" latinLnBrk="0" hangingPunct="1">
+      <a:defRPr sz="1200" kern="1200">
+        <a:solidFill>
+          <a:schemeClr val="tx1"/>
+        </a:solidFill>
+        <a:latin typeface="+mn-lt"/>
+        <a:ea typeface="+mn-ea"/>
+        <a:cs typeface="+mn-cs"/>
+      </a:defRPr>
+    </a:lvl7pPr>
+    <a:lvl8pPr marL="3200400" algn="l" defTabSz="914400" rtl="0" eaLnBrk="1" latinLnBrk="0" hangingPunct="1">
+      <a:defRPr sz="1200" kern="1200">
+        <a:solidFill>
+          <a:schemeClr val="tx1"/>
+        </a:solidFill>
+        <a:latin typeface="+mn-lt"/>
+        <a:ea typeface="+mn-ea"/>
+        <a:cs typeface="+mn-cs"/>
+      </a:defRPr>
+    </a:lvl8pPr>
+    <a:lvl9pPr marL="3657600" algn="l" defTabSz="914400" rtl="0" eaLnBrk="1" latinLnBrk="0" hangingPunct="1">
+      <a:defRPr sz="1200" kern="1200">
+        <a:solidFill>
+          <a:schemeClr val="tx1"/>
+        </a:solidFill>
+        <a:latin typeface="+mn-lt"/>
+        <a:ea typeface="+mn-ea"/>
+        <a:cs typeface="+mn-cs"/>
+      </a:defRPr>
+    </a:lvl9pPr>
+  </p:notesStyle>
+</p:notesMaster>
+</file>
+
+<file path=ppt/notesSlides/notesSlide1.xml><?xml version="1.0" encoding="utf-8"?>
+<p:notes xmlns:a="http://schemas.openxmlformats.org/drawingml/2006/main" xmlns:r="http://schemas.openxmlformats.org/officeDocument/2006/relationships" xmlns:p="http://schemas.openxmlformats.org/presentationml/2006/main">
+  <p:cSld>
+    <p:spTree>
+      <p:nvGrpSpPr>
+        <p:cNvPr id="1" name=""/>
+        <p:cNvGrpSpPr/>
+        <p:nvPr/>
+      </p:nvGrpSpPr>
+      <p:grpSpPr>
+        <a:xfrm>
+          <a:off x="0" y="0"/>
+          <a:ext cx="0" cy="0"/>
+          <a:chOff x="0" y="0"/>
+          <a:chExt cx="0" cy="0"/>
+        </a:xfrm>
+      </p:grpSpPr>
+      <p:sp>
+        <p:nvSpPr>
+          <p:cNvPr id="2" name="Slide Image Placeholder 1"/>
+          <p:cNvSpPr>
+            <a:spLocks noGrp="1" noRot="1" noChangeAspect="1"/>
+          </p:cNvSpPr>
+          <p:nvPr>
+            <p:ph type="sldImg"/>
+          </p:nvPr>
+        </p:nvSpPr>
+        <p:spPr/>
+      </p:sp>
+      <p:sp>
+        <p:nvSpPr>
+          <p:cNvPr id="3" name="Notes Placeholder 2"/>
+          <p:cNvSpPr>
+            <a:spLocks noGrp="1"/>
+          </p:cNvSpPr>
+          <p:nvPr>
+            <p:ph type="body" idx="1"/>
+          </p:nvPr>
+        </p:nvSpPr>
+        <p:spPr/>
+        <p:txBody>
+          <a:bodyPr/>
+          <a:lstStyle/>
+          <a:p>
+            <a:r>
+              <a:rPr lang="en-US" dirty="0"/>
+              <a:t>0.8 in encoding attention </a:t>
+            </a:r>
+          </a:p>
+          <a:p>
+            <a:r>
+              <a:rPr lang="en-US" dirty="0"/>
+              <a:t>Criterions – how many subjects got rejected </a:t>
+            </a:r>
+          </a:p>
+        </p:txBody>
+      </p:sp>
+      <p:sp>
+        <p:nvSpPr>
+          <p:cNvPr id="4" name="Slide Number Placeholder 3"/>
+          <p:cNvSpPr>
+            <a:spLocks noGrp="1"/>
+          </p:cNvSpPr>
+          <p:nvPr>
+            <p:ph type="sldNum" sz="quarter" idx="5"/>
+          </p:nvPr>
+        </p:nvSpPr>
+        <p:spPr/>
+        <p:txBody>
+          <a:bodyPr/>
+          <a:lstStyle/>
+          <a:p>
+            <a:fld id="{C47F5BE4-EC01-47CF-85A1-260D51F7AD26}" type="slidenum">
+              <a:rPr lang="en-US" smtClean="0"/>
+              <a:t>2</a:t>
+            </a:fld>
+            <a:endParaRPr lang="en-US"/>
+          </a:p>
+        </p:txBody>
+      </p:sp>
+    </p:spTree>
+    <p:extLst>
+      <p:ext uri="{BB962C8B-B14F-4D97-AF65-F5344CB8AC3E}">
+        <p14:creationId xmlns:p14="http://schemas.microsoft.com/office/powerpoint/2010/main" val="1979883956"/>
+      </p:ext>
+    </p:extLst>
+  </p:cSld>
+  <p:clrMapOvr>
+    <a:masterClrMapping/>
+  </p:clrMapOvr>
+</p:notes>
+</file>
+
+<file path=ppt/notesSlides/notesSlide2.xml><?xml version="1.0" encoding="utf-8"?>
+<p:notes xmlns:a="http://schemas.openxmlformats.org/drawingml/2006/main" xmlns:r="http://schemas.openxmlformats.org/officeDocument/2006/relationships" xmlns:p="http://schemas.openxmlformats.org/presentationml/2006/main">
+  <p:cSld>
+    <p:spTree>
+      <p:nvGrpSpPr>
+        <p:cNvPr id="1" name=""/>
+        <p:cNvGrpSpPr/>
+        <p:nvPr/>
+      </p:nvGrpSpPr>
+      <p:grpSpPr>
+        <a:xfrm>
+          <a:off x="0" y="0"/>
+          <a:ext cx="0" cy="0"/>
+          <a:chOff x="0" y="0"/>
+          <a:chExt cx="0" cy="0"/>
+        </a:xfrm>
+      </p:grpSpPr>
+      <p:sp>
+        <p:nvSpPr>
+          <p:cNvPr id="2" name="Slide Image Placeholder 1"/>
+          <p:cNvSpPr>
+            <a:spLocks noGrp="1" noRot="1" noChangeAspect="1"/>
+          </p:cNvSpPr>
+          <p:nvPr>
+            <p:ph type="sldImg"/>
+          </p:nvPr>
+        </p:nvSpPr>
+        <p:spPr/>
+      </p:sp>
+      <p:sp>
+        <p:nvSpPr>
+          <p:cNvPr id="3" name="Notes Placeholder 2"/>
+          <p:cNvSpPr>
+            <a:spLocks noGrp="1"/>
+          </p:cNvSpPr>
+          <p:nvPr>
+            <p:ph type="body" idx="1"/>
+          </p:nvPr>
+        </p:nvSpPr>
+        <p:spPr/>
+        <p:txBody>
+          <a:bodyPr/>
+          <a:lstStyle/>
+          <a:p>
+            <a:endParaRPr lang="en-US" dirty="0"/>
+          </a:p>
+        </p:txBody>
+      </p:sp>
+      <p:sp>
+        <p:nvSpPr>
+          <p:cNvPr id="4" name="Slide Number Placeholder 3"/>
+          <p:cNvSpPr>
+            <a:spLocks noGrp="1"/>
+          </p:cNvSpPr>
+          <p:nvPr>
+            <p:ph type="sldNum" sz="quarter" idx="5"/>
+          </p:nvPr>
+        </p:nvSpPr>
+        <p:spPr/>
+        <p:txBody>
+          <a:bodyPr/>
+          <a:lstStyle/>
+          <a:p>
+            <a:fld id="{C47F5BE4-EC01-47CF-85A1-260D51F7AD26}" type="slidenum">
+              <a:rPr lang="en-US" smtClean="0"/>
+              <a:t>6</a:t>
+            </a:fld>
+            <a:endParaRPr lang="en-US"/>
+          </a:p>
+        </p:txBody>
+      </p:sp>
+    </p:spTree>
+    <p:extLst>
+      <p:ext uri="{BB962C8B-B14F-4D97-AF65-F5344CB8AC3E}">
+        <p14:creationId xmlns:p14="http://schemas.microsoft.com/office/powerpoint/2010/main" val="4152851143"/>
+      </p:ext>
+    </p:extLst>
+  </p:cSld>
+  <p:clrMapOvr>
+    <a:masterClrMapping/>
+  </p:clrMapOvr>
+</p:notes>
+</file>
+
 <file path=ppt/slideLayouts/slideLayout1.xml><?xml version="1.0" encoding="utf-8"?>
 <p:sldLayout xmlns:a="http://schemas.openxmlformats.org/drawingml/2006/main" xmlns:r="http://schemas.openxmlformats.org/officeDocument/2006/relationships" xmlns:p="http://schemas.openxmlformats.org/presentationml/2006/main" type="title" preserve="1">
   <p:cSld name="Title Slide">
@@ -264,7 +803,7 @@
           <a:p>
             <a:fld id="{746D8B40-9AC9-4F2C-97EE-79B1EF773A5B}" type="datetimeFigureOut">
               <a:rPr lang="en-US" smtClean="0"/>
-              <a:t>9/28/2022</a:t>
+              <a:t>10/23/2022</a:t>
             </a:fld>
             <a:endParaRPr lang="en-US"/>
           </a:p>
@@ -462,7 +1001,7 @@
           <a:p>
             <a:fld id="{746D8B40-9AC9-4F2C-97EE-79B1EF773A5B}" type="datetimeFigureOut">
               <a:rPr lang="en-US" smtClean="0"/>
-              <a:t>9/28/2022</a:t>
+              <a:t>10/23/2022</a:t>
             </a:fld>
             <a:endParaRPr lang="en-US"/>
           </a:p>
@@ -670,7 +1209,7 @@
           <a:p>
             <a:fld id="{746D8B40-9AC9-4F2C-97EE-79B1EF773A5B}" type="datetimeFigureOut">
               <a:rPr lang="en-US" smtClean="0"/>
-              <a:t>9/28/2022</a:t>
+              <a:t>10/23/2022</a:t>
             </a:fld>
             <a:endParaRPr lang="en-US"/>
           </a:p>
@@ -868,7 +1407,7 @@
           <a:p>
             <a:fld id="{746D8B40-9AC9-4F2C-97EE-79B1EF773A5B}" type="datetimeFigureOut">
               <a:rPr lang="en-US" smtClean="0"/>
-              <a:t>9/28/2022</a:t>
+              <a:t>10/23/2022</a:t>
             </a:fld>
             <a:endParaRPr lang="en-US"/>
           </a:p>
@@ -1143,7 +1682,7 @@
           <a:p>
             <a:fld id="{746D8B40-9AC9-4F2C-97EE-79B1EF773A5B}" type="datetimeFigureOut">
               <a:rPr lang="en-US" smtClean="0"/>
-              <a:t>9/28/2022</a:t>
+              <a:t>10/23/2022</a:t>
             </a:fld>
             <a:endParaRPr lang="en-US"/>
           </a:p>
@@ -1408,7 +1947,7 @@
           <a:p>
             <a:fld id="{746D8B40-9AC9-4F2C-97EE-79B1EF773A5B}" type="datetimeFigureOut">
               <a:rPr lang="en-US" smtClean="0"/>
-              <a:t>9/28/2022</a:t>
+              <a:t>10/23/2022</a:t>
             </a:fld>
             <a:endParaRPr lang="en-US"/>
           </a:p>
@@ -1820,7 +2359,7 @@
           <a:p>
             <a:fld id="{746D8B40-9AC9-4F2C-97EE-79B1EF773A5B}" type="datetimeFigureOut">
               <a:rPr lang="en-US" smtClean="0"/>
-              <a:t>9/28/2022</a:t>
+              <a:t>10/23/2022</a:t>
             </a:fld>
             <a:endParaRPr lang="en-US"/>
           </a:p>
@@ -1961,7 +2500,7 @@
           <a:p>
             <a:fld id="{746D8B40-9AC9-4F2C-97EE-79B1EF773A5B}" type="datetimeFigureOut">
               <a:rPr lang="en-US" smtClean="0"/>
-              <a:t>9/28/2022</a:t>
+              <a:t>10/23/2022</a:t>
             </a:fld>
             <a:endParaRPr lang="en-US"/>
           </a:p>
@@ -2074,7 +2613,7 @@
           <a:p>
             <a:fld id="{746D8B40-9AC9-4F2C-97EE-79B1EF773A5B}" type="datetimeFigureOut">
               <a:rPr lang="en-US" smtClean="0"/>
-              <a:t>9/28/2022</a:t>
+              <a:t>10/23/2022</a:t>
             </a:fld>
             <a:endParaRPr lang="en-US"/>
           </a:p>
@@ -2385,7 +2924,7 @@
           <a:p>
             <a:fld id="{746D8B40-9AC9-4F2C-97EE-79B1EF773A5B}" type="datetimeFigureOut">
               <a:rPr lang="en-US" smtClean="0"/>
-              <a:t>9/28/2022</a:t>
+              <a:t>10/23/2022</a:t>
             </a:fld>
             <a:endParaRPr lang="en-US"/>
           </a:p>
@@ -2673,7 +3212,7 @@
           <a:p>
             <a:fld id="{746D8B40-9AC9-4F2C-97EE-79B1EF773A5B}" type="datetimeFigureOut">
               <a:rPr lang="en-US" smtClean="0"/>
-              <a:t>9/28/2022</a:t>
+              <a:t>10/23/2022</a:t>
             </a:fld>
             <a:endParaRPr lang="en-US"/>
           </a:p>
@@ -2914,7 +3453,7 @@
           <a:p>
             <a:fld id="{746D8B40-9AC9-4F2C-97EE-79B1EF773A5B}" type="datetimeFigureOut">
               <a:rPr lang="en-US" smtClean="0"/>
-              <a:t>9/28/2022</a:t>
+              <a:t>10/23/2022</a:t>
             </a:fld>
             <a:endParaRPr lang="en-US"/>
           </a:p>
@@ -3384,7 +3923,7 @@
           <a:p>
             <a:r>
               <a:rPr lang="en-US" sz="3600" dirty="0"/>
-              <a:t>Pilot 1 </a:t>
+              <a:t>Pilot 1 + 2</a:t>
             </a:r>
           </a:p>
         </p:txBody>
@@ -3393,6 +3932,1129 @@
     <p:extLst>
       <p:ext uri="{BB962C8B-B14F-4D97-AF65-F5344CB8AC3E}">
         <p14:creationId xmlns:p14="http://schemas.microsoft.com/office/powerpoint/2010/main" val="2341669735"/>
+      </p:ext>
+    </p:extLst>
+  </p:cSld>
+  <p:clrMapOvr>
+    <a:masterClrMapping/>
+  </p:clrMapOvr>
+</p:sld>
+</file>
+
+<file path=ppt/slides/slide10.xml><?xml version="1.0" encoding="utf-8"?>
+<p:sld xmlns:a="http://schemas.openxmlformats.org/drawingml/2006/main" xmlns:r="http://schemas.openxmlformats.org/officeDocument/2006/relationships" xmlns:p="http://schemas.openxmlformats.org/presentationml/2006/main">
+  <p:cSld>
+    <p:spTree>
+      <p:nvGrpSpPr>
+        <p:cNvPr id="1" name=""/>
+        <p:cNvGrpSpPr/>
+        <p:nvPr/>
+      </p:nvGrpSpPr>
+      <p:grpSpPr>
+        <a:xfrm>
+          <a:off x="0" y="0"/>
+          <a:ext cx="0" cy="0"/>
+          <a:chOff x="0" y="0"/>
+          <a:chExt cx="0" cy="0"/>
+        </a:xfrm>
+      </p:grpSpPr>
+      <p:sp>
+        <p:nvSpPr>
+          <p:cNvPr id="2" name="Title 1">
+            <a:extLst>
+              <a:ext uri="{FF2B5EF4-FFF2-40B4-BE49-F238E27FC236}">
+                <a16:creationId xmlns:a16="http://schemas.microsoft.com/office/drawing/2014/main" id="{843AC5A9-669D-295E-3F0D-D6AA4D5C0582}"/>
+              </a:ext>
+            </a:extLst>
+          </p:cNvPr>
+          <p:cNvSpPr>
+            <a:spLocks noGrp="1"/>
+          </p:cNvSpPr>
+          <p:nvPr>
+            <p:ph type="title"/>
+          </p:nvPr>
+        </p:nvSpPr>
+        <p:spPr/>
+        <p:txBody>
+          <a:bodyPr/>
+          <a:lstStyle/>
+          <a:p>
+            <a:r>
+              <a:rPr lang="en-US" b="1" dirty="0"/>
+              <a:t>Pilot 1 + Pilot 2 </a:t>
+            </a:r>
+          </a:p>
+        </p:txBody>
+      </p:sp>
+      <p:sp>
+        <p:nvSpPr>
+          <p:cNvPr id="3" name="Content Placeholder 2">
+            <a:extLst>
+              <a:ext uri="{FF2B5EF4-FFF2-40B4-BE49-F238E27FC236}">
+                <a16:creationId xmlns:a16="http://schemas.microsoft.com/office/drawing/2014/main" id="{F7D52CA3-97D5-83C6-1DB9-AB752399544C}"/>
+              </a:ext>
+            </a:extLst>
+          </p:cNvPr>
+          <p:cNvSpPr>
+            <a:spLocks noGrp="1"/>
+          </p:cNvSpPr>
+          <p:nvPr>
+            <p:ph idx="1"/>
+          </p:nvPr>
+        </p:nvSpPr>
+        <p:spPr/>
+        <p:txBody>
+          <a:bodyPr/>
+          <a:lstStyle/>
+          <a:p>
+            <a:r>
+              <a:rPr lang="en-US" dirty="0"/>
+              <a:t>187 total subjects</a:t>
+            </a:r>
+          </a:p>
+          <a:p>
+            <a:r>
+              <a:rPr lang="en-US" dirty="0"/>
+              <a:t>62 qualified subjects</a:t>
+            </a:r>
+          </a:p>
+          <a:p>
+            <a:pPr marL="0" indent="0">
+              <a:buNone/>
+            </a:pPr>
+            <a:endParaRPr lang="en-US" dirty="0"/>
+          </a:p>
+        </p:txBody>
+      </p:sp>
+    </p:spTree>
+    <p:extLst>
+      <p:ext uri="{BB962C8B-B14F-4D97-AF65-F5344CB8AC3E}">
+        <p14:creationId xmlns:p14="http://schemas.microsoft.com/office/powerpoint/2010/main" val="2344929684"/>
+      </p:ext>
+    </p:extLst>
+  </p:cSld>
+  <p:clrMapOvr>
+    <a:masterClrMapping/>
+  </p:clrMapOvr>
+</p:sld>
+</file>
+
+<file path=ppt/slides/slide11.xml><?xml version="1.0" encoding="utf-8"?>
+<p:sld xmlns:a="http://schemas.openxmlformats.org/drawingml/2006/main" xmlns:r="http://schemas.openxmlformats.org/officeDocument/2006/relationships" xmlns:p="http://schemas.openxmlformats.org/presentationml/2006/main">
+  <p:cSld>
+    <p:spTree>
+      <p:nvGrpSpPr>
+        <p:cNvPr id="1" name=""/>
+        <p:cNvGrpSpPr/>
+        <p:nvPr/>
+      </p:nvGrpSpPr>
+      <p:grpSpPr>
+        <a:xfrm>
+          <a:off x="0" y="0"/>
+          <a:ext cx="0" cy="0"/>
+          <a:chOff x="0" y="0"/>
+          <a:chExt cx="0" cy="0"/>
+        </a:xfrm>
+      </p:grpSpPr>
+      <p:sp>
+        <p:nvSpPr>
+          <p:cNvPr id="2" name="Title 1">
+            <a:extLst>
+              <a:ext uri="{FF2B5EF4-FFF2-40B4-BE49-F238E27FC236}">
+                <a16:creationId xmlns:a16="http://schemas.microsoft.com/office/drawing/2014/main" id="{45641B00-B527-7497-554E-CB45257AE803}"/>
+              </a:ext>
+            </a:extLst>
+          </p:cNvPr>
+          <p:cNvSpPr>
+            <a:spLocks noGrp="1"/>
+          </p:cNvSpPr>
+          <p:nvPr>
+            <p:ph type="title"/>
+          </p:nvPr>
+        </p:nvSpPr>
+        <p:spPr/>
+        <p:txBody>
+          <a:bodyPr/>
+          <a:lstStyle/>
+          <a:p>
+            <a:r>
+              <a:rPr lang="en-US" dirty="0"/>
+              <a:t>Testing qualifications for inclusion </a:t>
+            </a:r>
+          </a:p>
+        </p:txBody>
+      </p:sp>
+      <p:graphicFrame>
+        <p:nvGraphicFramePr>
+          <p:cNvPr id="4" name="Table 4">
+            <a:extLst>
+              <a:ext uri="{FF2B5EF4-FFF2-40B4-BE49-F238E27FC236}">
+                <a16:creationId xmlns:a16="http://schemas.microsoft.com/office/drawing/2014/main" id="{F9B02CB2-8F52-7F5E-C244-A71C0C899190}"/>
+              </a:ext>
+            </a:extLst>
+          </p:cNvPr>
+          <p:cNvGraphicFramePr>
+            <a:graphicFrameLocks noGrp="1"/>
+          </p:cNvGraphicFramePr>
+          <p:nvPr>
+            <p:ph idx="1"/>
+            <p:extLst>
+              <p:ext uri="{D42A27DB-BD31-4B8C-83A1-F6EECF244321}">
+                <p14:modId xmlns:p14="http://schemas.microsoft.com/office/powerpoint/2010/main" val="1552909186"/>
+              </p:ext>
+            </p:extLst>
+          </p:nvPr>
+        </p:nvGraphicFramePr>
+        <p:xfrm>
+          <a:off x="895350" y="1825625"/>
+          <a:ext cx="10515600" cy="2595880"/>
+        </p:xfrm>
+        <a:graphic>
+          <a:graphicData uri="http://schemas.openxmlformats.org/drawingml/2006/table">
+            <a:tbl>
+              <a:tblPr firstRow="1" bandRow="1">
+                <a:tableStyleId>{5C22544A-7EE6-4342-B048-85BDC9FD1C3A}</a:tableStyleId>
+              </a:tblPr>
+              <a:tblGrid>
+                <a:gridCol w="2103120">
+                  <a:extLst>
+                    <a:ext uri="{9D8B030D-6E8A-4147-A177-3AD203B41FA5}">
+                      <a16:colId xmlns:a16="http://schemas.microsoft.com/office/drawing/2014/main" val="2297147660"/>
+                    </a:ext>
+                  </a:extLst>
+                </a:gridCol>
+                <a:gridCol w="2103120">
+                  <a:extLst>
+                    <a:ext uri="{9D8B030D-6E8A-4147-A177-3AD203B41FA5}">
+                      <a16:colId xmlns:a16="http://schemas.microsoft.com/office/drawing/2014/main" val="3239448566"/>
+                    </a:ext>
+                  </a:extLst>
+                </a:gridCol>
+                <a:gridCol w="2103120">
+                  <a:extLst>
+                    <a:ext uri="{9D8B030D-6E8A-4147-A177-3AD203B41FA5}">
+                      <a16:colId xmlns:a16="http://schemas.microsoft.com/office/drawing/2014/main" val="349923910"/>
+                    </a:ext>
+                  </a:extLst>
+                </a:gridCol>
+                <a:gridCol w="2103120">
+                  <a:extLst>
+                    <a:ext uri="{9D8B030D-6E8A-4147-A177-3AD203B41FA5}">
+                      <a16:colId xmlns:a16="http://schemas.microsoft.com/office/drawing/2014/main" val="114760489"/>
+                    </a:ext>
+                  </a:extLst>
+                </a:gridCol>
+                <a:gridCol w="2103120">
+                  <a:extLst>
+                    <a:ext uri="{9D8B030D-6E8A-4147-A177-3AD203B41FA5}">
+                      <a16:colId xmlns:a16="http://schemas.microsoft.com/office/drawing/2014/main" val="1234482528"/>
+                    </a:ext>
+                  </a:extLst>
+                </a:gridCol>
+              </a:tblGrid>
+              <a:tr h="370840">
+                <a:tc>
+                  <a:txBody>
+                    <a:bodyPr/>
+                    <a:lstStyle/>
+                    <a:p>
+                      <a:r>
+                        <a:rPr lang="en-US" dirty="0"/>
+                        <a:t>Qualification </a:t>
+                      </a:r>
+                    </a:p>
+                  </a:txBody>
+                  <a:tcPr/>
+                </a:tc>
+                <a:tc>
+                  <a:txBody>
+                    <a:bodyPr/>
+                    <a:lstStyle/>
+                    <a:p>
+                      <a:endParaRPr lang="en-US" dirty="0"/>
+                    </a:p>
+                  </a:txBody>
+                  <a:tcPr/>
+                </a:tc>
+                <a:tc>
+                  <a:txBody>
+                    <a:bodyPr/>
+                    <a:lstStyle/>
+                    <a:p>
+                      <a:r>
+                        <a:rPr lang="en-US" dirty="0"/>
+                        <a:t>P - value</a:t>
+                      </a:r>
+                    </a:p>
+                  </a:txBody>
+                  <a:tcPr/>
+                </a:tc>
+                <a:tc>
+                  <a:txBody>
+                    <a:bodyPr/>
+                    <a:lstStyle/>
+                    <a:p>
+                      <a:r>
+                        <a:rPr lang="en-US" dirty="0"/>
+                        <a:t>Passed mean</a:t>
+                      </a:r>
+                    </a:p>
+                  </a:txBody>
+                  <a:tcPr/>
+                </a:tc>
+                <a:tc>
+                  <a:txBody>
+                    <a:bodyPr/>
+                    <a:lstStyle/>
+                    <a:p>
+                      <a:r>
+                        <a:rPr lang="en-US" dirty="0"/>
+                        <a:t>Failed mean </a:t>
+                      </a:r>
+                    </a:p>
+                  </a:txBody>
+                  <a:tcPr/>
+                </a:tc>
+                <a:extLst>
+                  <a:ext uri="{0D108BD9-81ED-4DB2-BD59-A6C34878D82A}">
+                    <a16:rowId xmlns:a16="http://schemas.microsoft.com/office/drawing/2014/main" val="37599389"/>
+                  </a:ext>
+                </a:extLst>
+              </a:tr>
+              <a:tr h="370840">
+                <a:tc>
+                  <a:txBody>
+                    <a:bodyPr/>
+                    <a:lstStyle/>
+                    <a:p>
+                      <a:r>
+                        <a:rPr lang="en-US" dirty="0"/>
+                        <a:t>Demo accuracy</a:t>
+                      </a:r>
+                    </a:p>
+                  </a:txBody>
+                  <a:tcPr/>
+                </a:tc>
+                <a:tc>
+                  <a:txBody>
+                    <a:bodyPr/>
+                    <a:lstStyle/>
+                    <a:p>
+                      <a:r>
+                        <a:rPr lang="en-US" dirty="0"/>
+                        <a:t>t((132, 55)) = 3.5</a:t>
+                      </a:r>
+                    </a:p>
+                  </a:txBody>
+                  <a:tcPr/>
+                </a:tc>
+                <a:tc>
+                  <a:txBody>
+                    <a:bodyPr/>
+                    <a:lstStyle/>
+                    <a:p>
+                      <a:r>
+                        <a:rPr lang="en-US" dirty="0"/>
+                        <a:t>p = 0.001</a:t>
+                      </a:r>
+                    </a:p>
+                  </a:txBody>
+                  <a:tcPr/>
+                </a:tc>
+                <a:tc>
+                  <a:txBody>
+                    <a:bodyPr/>
+                    <a:lstStyle/>
+                    <a:p>
+                      <a:r>
+                        <a:rPr lang="en-US" dirty="0"/>
+                        <a:t>0.66</a:t>
+                      </a:r>
+                    </a:p>
+                  </a:txBody>
+                  <a:tcPr/>
+                </a:tc>
+                <a:tc>
+                  <a:txBody>
+                    <a:bodyPr/>
+                    <a:lstStyle/>
+                    <a:p>
+                      <a:r>
+                        <a:rPr lang="en-US" dirty="0"/>
+                        <a:t>0.60</a:t>
+                      </a:r>
+                    </a:p>
+                  </a:txBody>
+                  <a:tcPr/>
+                </a:tc>
+                <a:extLst>
+                  <a:ext uri="{0D108BD9-81ED-4DB2-BD59-A6C34878D82A}">
+                    <a16:rowId xmlns:a16="http://schemas.microsoft.com/office/drawing/2014/main" val="1785518722"/>
+                  </a:ext>
+                </a:extLst>
+              </a:tr>
+              <a:tr h="370840">
+                <a:tc>
+                  <a:txBody>
+                    <a:bodyPr/>
+                    <a:lstStyle/>
+                    <a:p>
+                      <a:r>
+                        <a:rPr lang="en-US" dirty="0"/>
+                        <a:t>Demo attention </a:t>
+                      </a:r>
+                    </a:p>
+                  </a:txBody>
+                  <a:tcPr/>
+                </a:tc>
+                <a:tc>
+                  <a:txBody>
+                    <a:bodyPr/>
+                    <a:lstStyle/>
+                    <a:p>
+                      <a:r>
+                        <a:rPr lang="en-US" dirty="0"/>
+                        <a:t>t((133, 54)) = 1.54</a:t>
+                      </a:r>
+                    </a:p>
+                  </a:txBody>
+                  <a:tcPr/>
+                </a:tc>
+                <a:tc>
+                  <a:txBody>
+                    <a:bodyPr/>
+                    <a:lstStyle/>
+                    <a:p>
+                      <a:r>
+                        <a:rPr lang="en-US" dirty="0"/>
+                        <a:t>p = 0.125</a:t>
+                      </a:r>
+                    </a:p>
+                  </a:txBody>
+                  <a:tcPr/>
+                </a:tc>
+                <a:tc>
+                  <a:txBody>
+                    <a:bodyPr/>
+                    <a:lstStyle/>
+                    <a:p>
+                      <a:r>
+                        <a:rPr lang="en-US" dirty="0"/>
+                        <a:t>0.65</a:t>
+                      </a:r>
+                    </a:p>
+                  </a:txBody>
+                  <a:tcPr/>
+                </a:tc>
+                <a:tc>
+                  <a:txBody>
+                    <a:bodyPr/>
+                    <a:lstStyle/>
+                    <a:p>
+                      <a:r>
+                        <a:rPr lang="en-US" dirty="0"/>
+                        <a:t>0.62</a:t>
+                      </a:r>
+                    </a:p>
+                  </a:txBody>
+                  <a:tcPr/>
+                </a:tc>
+                <a:extLst>
+                  <a:ext uri="{0D108BD9-81ED-4DB2-BD59-A6C34878D82A}">
+                    <a16:rowId xmlns:a16="http://schemas.microsoft.com/office/drawing/2014/main" val="2142536030"/>
+                  </a:ext>
+                </a:extLst>
+              </a:tr>
+              <a:tr h="370840">
+                <a:tc>
+                  <a:txBody>
+                    <a:bodyPr/>
+                    <a:lstStyle/>
+                    <a:p>
+                      <a:r>
+                        <a:rPr lang="en-US" dirty="0"/>
+                        <a:t>Encoding accuracy</a:t>
+                      </a:r>
+                    </a:p>
+                  </a:txBody>
+                  <a:tcPr/>
+                </a:tc>
+                <a:tc>
+                  <a:txBody>
+                    <a:bodyPr/>
+                    <a:lstStyle/>
+                    <a:p>
+                      <a:r>
+                        <a:rPr lang="en-US" dirty="0"/>
+                        <a:t>t((100, 87)) = 5.064</a:t>
+                      </a:r>
+                    </a:p>
+                  </a:txBody>
+                  <a:tcPr/>
+                </a:tc>
+                <a:tc>
+                  <a:txBody>
+                    <a:bodyPr/>
+                    <a:lstStyle/>
+                    <a:p>
+                      <a:r>
+                        <a:rPr lang="en-US" dirty="0"/>
+                        <a:t>p = 0.000</a:t>
+                      </a:r>
+                    </a:p>
+                  </a:txBody>
+                  <a:tcPr/>
+                </a:tc>
+                <a:tc>
+                  <a:txBody>
+                    <a:bodyPr/>
+                    <a:lstStyle/>
+                    <a:p>
+                      <a:r>
+                        <a:rPr lang="en-US" dirty="0"/>
+                        <a:t>0.68</a:t>
+                      </a:r>
+                    </a:p>
+                  </a:txBody>
+                  <a:tcPr/>
+                </a:tc>
+                <a:tc>
+                  <a:txBody>
+                    <a:bodyPr/>
+                    <a:lstStyle/>
+                    <a:p>
+                      <a:r>
+                        <a:rPr lang="en-US" dirty="0"/>
+                        <a:t>0.60</a:t>
+                      </a:r>
+                    </a:p>
+                  </a:txBody>
+                  <a:tcPr/>
+                </a:tc>
+                <a:extLst>
+                  <a:ext uri="{0D108BD9-81ED-4DB2-BD59-A6C34878D82A}">
+                    <a16:rowId xmlns:a16="http://schemas.microsoft.com/office/drawing/2014/main" val="513919147"/>
+                  </a:ext>
+                </a:extLst>
+              </a:tr>
+              <a:tr h="370840">
+                <a:tc>
+                  <a:txBody>
+                    <a:bodyPr/>
+                    <a:lstStyle/>
+                    <a:p>
+                      <a:r>
+                        <a:rPr lang="en-US" dirty="0"/>
+                        <a:t>Response strike</a:t>
+                      </a:r>
+                    </a:p>
+                  </a:txBody>
+                  <a:tcPr/>
+                </a:tc>
+                <a:tc>
+                  <a:txBody>
+                    <a:bodyPr/>
+                    <a:lstStyle/>
+                    <a:p>
+                      <a:r>
+                        <a:rPr lang="en-US" dirty="0"/>
+                        <a:t>t((166, 21)) = 4.72</a:t>
+                      </a:r>
+                    </a:p>
+                  </a:txBody>
+                  <a:tcPr/>
+                </a:tc>
+                <a:tc>
+                  <a:txBody>
+                    <a:bodyPr/>
+                    <a:lstStyle/>
+                    <a:p>
+                      <a:r>
+                        <a:rPr lang="en-US" dirty="0"/>
+                        <a:t>p = 0.00</a:t>
+                      </a:r>
+                    </a:p>
+                  </a:txBody>
+                  <a:tcPr/>
+                </a:tc>
+                <a:tc>
+                  <a:txBody>
+                    <a:bodyPr/>
+                    <a:lstStyle/>
+                    <a:p>
+                      <a:r>
+                        <a:rPr lang="en-US" dirty="0"/>
+                        <a:t>0.66</a:t>
+                      </a:r>
+                    </a:p>
+                  </a:txBody>
+                  <a:tcPr/>
+                </a:tc>
+                <a:tc>
+                  <a:txBody>
+                    <a:bodyPr/>
+                    <a:lstStyle/>
+                    <a:p>
+                      <a:r>
+                        <a:rPr lang="en-US" dirty="0"/>
+                        <a:t>0.53</a:t>
+                      </a:r>
+                    </a:p>
+                  </a:txBody>
+                  <a:tcPr/>
+                </a:tc>
+                <a:extLst>
+                  <a:ext uri="{0D108BD9-81ED-4DB2-BD59-A6C34878D82A}">
+                    <a16:rowId xmlns:a16="http://schemas.microsoft.com/office/drawing/2014/main" val="835850019"/>
+                  </a:ext>
+                </a:extLst>
+              </a:tr>
+              <a:tr h="370840">
+                <a:tc>
+                  <a:txBody>
+                    <a:bodyPr/>
+                    <a:lstStyle/>
+                    <a:p>
+                      <a:r>
+                        <a:rPr lang="en-US" dirty="0"/>
+                        <a:t>Not too fast</a:t>
+                      </a:r>
+                    </a:p>
+                  </a:txBody>
+                  <a:tcPr/>
+                </a:tc>
+                <a:tc>
+                  <a:txBody>
+                    <a:bodyPr/>
+                    <a:lstStyle/>
+                    <a:p>
+                      <a:r>
+                        <a:rPr lang="en-US" dirty="0"/>
+                        <a:t>t((147, 40)) = 6.931</a:t>
+                      </a:r>
+                    </a:p>
+                  </a:txBody>
+                  <a:tcPr/>
+                </a:tc>
+                <a:tc>
+                  <a:txBody>
+                    <a:bodyPr/>
+                    <a:lstStyle/>
+                    <a:p>
+                      <a:r>
+                        <a:rPr lang="en-US" dirty="0"/>
+                        <a:t>p = 0.00</a:t>
+                      </a:r>
+                    </a:p>
+                  </a:txBody>
+                  <a:tcPr/>
+                </a:tc>
+                <a:tc>
+                  <a:txBody>
+                    <a:bodyPr/>
+                    <a:lstStyle/>
+                    <a:p>
+                      <a:r>
+                        <a:rPr lang="en-US" dirty="0"/>
+                        <a:t>0.67</a:t>
+                      </a:r>
+                    </a:p>
+                  </a:txBody>
+                  <a:tcPr/>
+                </a:tc>
+                <a:tc>
+                  <a:txBody>
+                    <a:bodyPr/>
+                    <a:lstStyle/>
+                    <a:p>
+                      <a:r>
+                        <a:rPr lang="en-US" dirty="0"/>
+                        <a:t>0.54</a:t>
+                      </a:r>
+                    </a:p>
+                  </a:txBody>
+                  <a:tcPr/>
+                </a:tc>
+                <a:extLst>
+                  <a:ext uri="{0D108BD9-81ED-4DB2-BD59-A6C34878D82A}">
+                    <a16:rowId xmlns:a16="http://schemas.microsoft.com/office/drawing/2014/main" val="1017605568"/>
+                  </a:ext>
+                </a:extLst>
+              </a:tr>
+              <a:tr h="370840">
+                <a:tc>
+                  <a:txBody>
+                    <a:bodyPr/>
+                    <a:lstStyle/>
+                    <a:p>
+                      <a:r>
+                        <a:rPr lang="en-US" dirty="0"/>
+                        <a:t>Not too slow</a:t>
+                      </a:r>
+                    </a:p>
+                  </a:txBody>
+                  <a:tcPr/>
+                </a:tc>
+                <a:tc>
+                  <a:txBody>
+                    <a:bodyPr/>
+                    <a:lstStyle/>
+                    <a:p>
+                      <a:r>
+                        <a:rPr lang="en-US" dirty="0"/>
+                        <a:t>t((173, 14)) = -0.873</a:t>
+                      </a:r>
+                    </a:p>
+                  </a:txBody>
+                  <a:tcPr/>
+                </a:tc>
+                <a:tc>
+                  <a:txBody>
+                    <a:bodyPr/>
+                    <a:lstStyle/>
+                    <a:p>
+                      <a:r>
+                        <a:rPr lang="en-US" dirty="0"/>
+                        <a:t>p = 0.384</a:t>
+                      </a:r>
+                    </a:p>
+                  </a:txBody>
+                  <a:tcPr/>
+                </a:tc>
+                <a:tc>
+                  <a:txBody>
+                    <a:bodyPr/>
+                    <a:lstStyle/>
+                    <a:p>
+                      <a:r>
+                        <a:rPr lang="en-US" dirty="0"/>
+                        <a:t>0.64</a:t>
+                      </a:r>
+                    </a:p>
+                  </a:txBody>
+                  <a:tcPr/>
+                </a:tc>
+                <a:tc>
+                  <a:txBody>
+                    <a:bodyPr/>
+                    <a:lstStyle/>
+                    <a:p>
+                      <a:r>
+                        <a:rPr lang="en-US" dirty="0"/>
+                        <a:t>0.67</a:t>
+                      </a:r>
+                    </a:p>
+                  </a:txBody>
+                  <a:tcPr/>
+                </a:tc>
+                <a:extLst>
+                  <a:ext uri="{0D108BD9-81ED-4DB2-BD59-A6C34878D82A}">
+                    <a16:rowId xmlns:a16="http://schemas.microsoft.com/office/drawing/2014/main" val="2511111196"/>
+                  </a:ext>
+                </a:extLst>
+              </a:tr>
+            </a:tbl>
+          </a:graphicData>
+        </a:graphic>
+      </p:graphicFrame>
+    </p:spTree>
+    <p:extLst>
+      <p:ext uri="{BB962C8B-B14F-4D97-AF65-F5344CB8AC3E}">
+        <p14:creationId xmlns:p14="http://schemas.microsoft.com/office/powerpoint/2010/main" val="89400837"/>
+      </p:ext>
+    </p:extLst>
+  </p:cSld>
+  <p:clrMapOvr>
+    <a:masterClrMapping/>
+  </p:clrMapOvr>
+</p:sld>
+</file>
+
+<file path=ppt/slides/slide12.xml><?xml version="1.0" encoding="utf-8"?>
+<p:sld xmlns:a="http://schemas.openxmlformats.org/drawingml/2006/main" xmlns:r="http://schemas.openxmlformats.org/officeDocument/2006/relationships" xmlns:p="http://schemas.openxmlformats.org/presentationml/2006/main">
+  <p:cSld>
+    <p:spTree>
+      <p:nvGrpSpPr>
+        <p:cNvPr id="1" name=""/>
+        <p:cNvGrpSpPr/>
+        <p:nvPr/>
+      </p:nvGrpSpPr>
+      <p:grpSpPr>
+        <a:xfrm>
+          <a:off x="0" y="0"/>
+          <a:ext cx="0" cy="0"/>
+          <a:chOff x="0" y="0"/>
+          <a:chExt cx="0" cy="0"/>
+        </a:xfrm>
+      </p:grpSpPr>
+      <p:pic>
+        <p:nvPicPr>
+          <p:cNvPr id="5" name="Picture 4">
+            <a:extLst>
+              <a:ext uri="{FF2B5EF4-FFF2-40B4-BE49-F238E27FC236}">
+                <a16:creationId xmlns:a16="http://schemas.microsoft.com/office/drawing/2014/main" id="{35C1C400-DDC0-D275-B94B-F840524CAC9D}"/>
+              </a:ext>
+            </a:extLst>
+          </p:cNvPr>
+          <p:cNvPicPr>
+            <a:picLocks noChangeAspect="1"/>
+          </p:cNvPicPr>
+          <p:nvPr/>
+        </p:nvPicPr>
+        <p:blipFill>
+          <a:blip r:embed="rId2"/>
+          <a:stretch>
+            <a:fillRect/>
+          </a:stretch>
+        </p:blipFill>
+        <p:spPr>
+          <a:xfrm>
+            <a:off x="0" y="365125"/>
+            <a:ext cx="8058150" cy="4267200"/>
+          </a:xfrm>
+          <a:prstGeom prst="rect">
+            <a:avLst/>
+          </a:prstGeom>
+        </p:spPr>
+      </p:pic>
+      <p:pic>
+        <p:nvPicPr>
+          <p:cNvPr id="7" name="Picture 6">
+            <a:extLst>
+              <a:ext uri="{FF2B5EF4-FFF2-40B4-BE49-F238E27FC236}">
+                <a16:creationId xmlns:a16="http://schemas.microsoft.com/office/drawing/2014/main" id="{7260AA7B-12F7-D376-81AA-795523F089BA}"/>
+              </a:ext>
+            </a:extLst>
+          </p:cNvPr>
+          <p:cNvPicPr>
+            <a:picLocks noChangeAspect="1"/>
+          </p:cNvPicPr>
+          <p:nvPr/>
+        </p:nvPicPr>
+        <p:blipFill>
+          <a:blip r:embed="rId3"/>
+          <a:stretch>
+            <a:fillRect/>
+          </a:stretch>
+        </p:blipFill>
+        <p:spPr>
+          <a:xfrm>
+            <a:off x="8372475" y="4295775"/>
+            <a:ext cx="3219450" cy="1771650"/>
+          </a:xfrm>
+          <a:prstGeom prst="rect">
+            <a:avLst/>
+          </a:prstGeom>
+        </p:spPr>
+      </p:pic>
+    </p:spTree>
+    <p:extLst>
+      <p:ext uri="{BB962C8B-B14F-4D97-AF65-F5344CB8AC3E}">
+        <p14:creationId xmlns:p14="http://schemas.microsoft.com/office/powerpoint/2010/main" val="126121327"/>
+      </p:ext>
+    </p:extLst>
+  </p:cSld>
+  <p:clrMapOvr>
+    <a:masterClrMapping/>
+  </p:clrMapOvr>
+</p:sld>
+</file>
+
+<file path=ppt/slides/slide13.xml><?xml version="1.0" encoding="utf-8"?>
+<p:sld xmlns:a="http://schemas.openxmlformats.org/drawingml/2006/main" xmlns:r="http://schemas.openxmlformats.org/officeDocument/2006/relationships" xmlns:p="http://schemas.openxmlformats.org/presentationml/2006/main">
+  <p:cSld>
+    <p:spTree>
+      <p:nvGrpSpPr>
+        <p:cNvPr id="1" name=""/>
+        <p:cNvGrpSpPr/>
+        <p:nvPr/>
+      </p:nvGrpSpPr>
+      <p:grpSpPr>
+        <a:xfrm>
+          <a:off x="0" y="0"/>
+          <a:ext cx="0" cy="0"/>
+          <a:chOff x="0" y="0"/>
+          <a:chExt cx="0" cy="0"/>
+        </a:xfrm>
+      </p:grpSpPr>
+      <p:pic>
+        <p:nvPicPr>
+          <p:cNvPr id="5" name="Picture 4">
+            <a:extLst>
+              <a:ext uri="{FF2B5EF4-FFF2-40B4-BE49-F238E27FC236}">
+                <a16:creationId xmlns:a16="http://schemas.microsoft.com/office/drawing/2014/main" id="{2F2F4F4D-7AA0-0903-227C-C2638199F61E}"/>
+              </a:ext>
+            </a:extLst>
+          </p:cNvPr>
+          <p:cNvPicPr>
+            <a:picLocks noChangeAspect="1"/>
+          </p:cNvPicPr>
+          <p:nvPr/>
+        </p:nvPicPr>
+        <p:blipFill>
+          <a:blip r:embed="rId2"/>
+          <a:stretch>
+            <a:fillRect/>
+          </a:stretch>
+        </p:blipFill>
+        <p:spPr>
+          <a:xfrm>
+            <a:off x="1066294" y="0"/>
+            <a:ext cx="10059412" cy="6858000"/>
+          </a:xfrm>
+          <a:prstGeom prst="rect">
+            <a:avLst/>
+          </a:prstGeom>
+        </p:spPr>
+      </p:pic>
+    </p:spTree>
+    <p:extLst>
+      <p:ext uri="{BB962C8B-B14F-4D97-AF65-F5344CB8AC3E}">
+        <p14:creationId xmlns:p14="http://schemas.microsoft.com/office/powerpoint/2010/main" val="2446756765"/>
+      </p:ext>
+    </p:extLst>
+  </p:cSld>
+  <p:clrMapOvr>
+    <a:masterClrMapping/>
+  </p:clrMapOvr>
+</p:sld>
+</file>
+
+<file path=ppt/slides/slide14.xml><?xml version="1.0" encoding="utf-8"?>
+<p:sld xmlns:a="http://schemas.openxmlformats.org/drawingml/2006/main" xmlns:r="http://schemas.openxmlformats.org/officeDocument/2006/relationships" xmlns:p="http://schemas.openxmlformats.org/presentationml/2006/main">
+  <p:cSld>
+    <p:spTree>
+      <p:nvGrpSpPr>
+        <p:cNvPr id="1" name=""/>
+        <p:cNvGrpSpPr/>
+        <p:nvPr/>
+      </p:nvGrpSpPr>
+      <p:grpSpPr>
+        <a:xfrm>
+          <a:off x="0" y="0"/>
+          <a:ext cx="0" cy="0"/>
+          <a:chOff x="0" y="0"/>
+          <a:chExt cx="0" cy="0"/>
+        </a:xfrm>
+      </p:grpSpPr>
+      <p:sp>
+        <p:nvSpPr>
+          <p:cNvPr id="2" name="Title 1">
+            <a:extLst>
+              <a:ext uri="{FF2B5EF4-FFF2-40B4-BE49-F238E27FC236}">
+                <a16:creationId xmlns:a16="http://schemas.microsoft.com/office/drawing/2014/main" id="{9C4DC24A-F5FB-9922-B56D-F01F43BB99A4}"/>
+              </a:ext>
+            </a:extLst>
+          </p:cNvPr>
+          <p:cNvSpPr>
+            <a:spLocks noGrp="1"/>
+          </p:cNvSpPr>
+          <p:nvPr>
+            <p:ph type="title"/>
+          </p:nvPr>
+        </p:nvSpPr>
+        <p:spPr/>
+        <p:txBody>
+          <a:bodyPr/>
+          <a:lstStyle/>
+          <a:p>
+            <a:endParaRPr lang="en-US"/>
+          </a:p>
+        </p:txBody>
+      </p:sp>
+      <p:sp>
+        <p:nvSpPr>
+          <p:cNvPr id="3" name="Content Placeholder 2">
+            <a:extLst>
+              <a:ext uri="{FF2B5EF4-FFF2-40B4-BE49-F238E27FC236}">
+                <a16:creationId xmlns:a16="http://schemas.microsoft.com/office/drawing/2014/main" id="{77EF3F17-C6BC-95A7-227D-9B3BFE84EE06}"/>
+              </a:ext>
+            </a:extLst>
+          </p:cNvPr>
+          <p:cNvSpPr>
+            <a:spLocks noGrp="1"/>
+          </p:cNvSpPr>
+          <p:nvPr>
+            <p:ph idx="1"/>
+          </p:nvPr>
+        </p:nvSpPr>
+        <p:spPr/>
+        <p:txBody>
+          <a:bodyPr/>
+          <a:lstStyle/>
+          <a:p>
+            <a:endParaRPr lang="en-US"/>
+          </a:p>
+        </p:txBody>
+      </p:sp>
+    </p:spTree>
+    <p:extLst>
+      <p:ext uri="{BB962C8B-B14F-4D97-AF65-F5344CB8AC3E}">
+        <p14:creationId xmlns:p14="http://schemas.microsoft.com/office/powerpoint/2010/main" val="2045856195"/>
+      </p:ext>
+    </p:extLst>
+  </p:cSld>
+  <p:clrMapOvr>
+    <a:masterClrMapping/>
+  </p:clrMapOvr>
+</p:sld>
+</file>
+
+<file path=ppt/slides/slide15.xml><?xml version="1.0" encoding="utf-8"?>
+<p:sld xmlns:a="http://schemas.openxmlformats.org/drawingml/2006/main" xmlns:r="http://schemas.openxmlformats.org/officeDocument/2006/relationships" xmlns:p="http://schemas.openxmlformats.org/presentationml/2006/main">
+  <p:cSld>
+    <p:spTree>
+      <p:nvGrpSpPr>
+        <p:cNvPr id="1" name=""/>
+        <p:cNvGrpSpPr/>
+        <p:nvPr/>
+      </p:nvGrpSpPr>
+      <p:grpSpPr>
+        <a:xfrm>
+          <a:off x="0" y="0"/>
+          <a:ext cx="0" cy="0"/>
+          <a:chOff x="0" y="0"/>
+          <a:chExt cx="0" cy="0"/>
+        </a:xfrm>
+      </p:grpSpPr>
+      <p:sp>
+        <p:nvSpPr>
+          <p:cNvPr id="2" name="Title 1">
+            <a:extLst>
+              <a:ext uri="{FF2B5EF4-FFF2-40B4-BE49-F238E27FC236}">
+                <a16:creationId xmlns:a16="http://schemas.microsoft.com/office/drawing/2014/main" id="{6B5217C7-2985-72DF-D102-ED682635C0F0}"/>
+              </a:ext>
+            </a:extLst>
+          </p:cNvPr>
+          <p:cNvSpPr>
+            <a:spLocks noGrp="1"/>
+          </p:cNvSpPr>
+          <p:nvPr>
+            <p:ph type="title"/>
+          </p:nvPr>
+        </p:nvSpPr>
+        <p:spPr/>
+        <p:txBody>
+          <a:bodyPr/>
+          <a:lstStyle/>
+          <a:p>
+            <a:endParaRPr lang="en-US"/>
+          </a:p>
+        </p:txBody>
+      </p:sp>
+      <p:sp>
+        <p:nvSpPr>
+          <p:cNvPr id="3" name="Content Placeholder 2">
+            <a:extLst>
+              <a:ext uri="{FF2B5EF4-FFF2-40B4-BE49-F238E27FC236}">
+                <a16:creationId xmlns:a16="http://schemas.microsoft.com/office/drawing/2014/main" id="{8E6AA1EF-3DCF-BE82-D5BC-615DC7A8664C}"/>
+              </a:ext>
+            </a:extLst>
+          </p:cNvPr>
+          <p:cNvSpPr>
+            <a:spLocks noGrp="1"/>
+          </p:cNvSpPr>
+          <p:nvPr>
+            <p:ph idx="1"/>
+          </p:nvPr>
+        </p:nvSpPr>
+        <p:spPr/>
+        <p:txBody>
+          <a:bodyPr/>
+          <a:lstStyle/>
+          <a:p>
+            <a:endParaRPr lang="en-US"/>
+          </a:p>
+        </p:txBody>
+      </p:sp>
+    </p:spTree>
+    <p:extLst>
+      <p:ext uri="{BB962C8B-B14F-4D97-AF65-F5344CB8AC3E}">
+        <p14:creationId xmlns:p14="http://schemas.microsoft.com/office/powerpoint/2010/main" val="685359054"/>
+      </p:ext>
+    </p:extLst>
+  </p:cSld>
+  <p:clrMapOvr>
+    <a:masterClrMapping/>
+  </p:clrMapOvr>
+</p:sld>
+</file>
+
+<file path=ppt/slides/slide16.xml><?xml version="1.0" encoding="utf-8"?>
+<p:sld xmlns:a="http://schemas.openxmlformats.org/drawingml/2006/main" xmlns:r="http://schemas.openxmlformats.org/officeDocument/2006/relationships" xmlns:p="http://schemas.openxmlformats.org/presentationml/2006/main">
+  <p:cSld>
+    <p:spTree>
+      <p:nvGrpSpPr>
+        <p:cNvPr id="1" name=""/>
+        <p:cNvGrpSpPr/>
+        <p:nvPr/>
+      </p:nvGrpSpPr>
+      <p:grpSpPr>
+        <a:xfrm>
+          <a:off x="0" y="0"/>
+          <a:ext cx="0" cy="0"/>
+          <a:chOff x="0" y="0"/>
+          <a:chExt cx="0" cy="0"/>
+        </a:xfrm>
+      </p:grpSpPr>
+      <p:sp>
+        <p:nvSpPr>
+          <p:cNvPr id="2" name="Title 1">
+            <a:extLst>
+              <a:ext uri="{FF2B5EF4-FFF2-40B4-BE49-F238E27FC236}">
+                <a16:creationId xmlns:a16="http://schemas.microsoft.com/office/drawing/2014/main" id="{716254B5-2645-2541-9B5E-3C88B53978A9}"/>
+              </a:ext>
+            </a:extLst>
+          </p:cNvPr>
+          <p:cNvSpPr>
+            <a:spLocks noGrp="1"/>
+          </p:cNvSpPr>
+          <p:nvPr>
+            <p:ph type="title"/>
+          </p:nvPr>
+        </p:nvSpPr>
+        <p:spPr/>
+        <p:txBody>
+          <a:bodyPr/>
+          <a:lstStyle/>
+          <a:p>
+            <a:endParaRPr lang="en-US"/>
+          </a:p>
+        </p:txBody>
+      </p:sp>
+      <p:pic>
+        <p:nvPicPr>
+          <p:cNvPr id="5" name="Content Placeholder 4">
+            <a:extLst>
+              <a:ext uri="{FF2B5EF4-FFF2-40B4-BE49-F238E27FC236}">
+                <a16:creationId xmlns:a16="http://schemas.microsoft.com/office/drawing/2014/main" id="{8E3D6106-BBEF-2236-FCC0-84D2C5F40708}"/>
+              </a:ext>
+            </a:extLst>
+          </p:cNvPr>
+          <p:cNvPicPr>
+            <a:picLocks noGrp="1" noChangeAspect="1"/>
+          </p:cNvPicPr>
+          <p:nvPr>
+            <p:ph idx="1"/>
+          </p:nvPr>
+        </p:nvPicPr>
+        <p:blipFill>
+          <a:blip r:embed="rId2"/>
+          <a:stretch>
+            <a:fillRect/>
+          </a:stretch>
+        </p:blipFill>
+        <p:spPr>
+          <a:xfrm>
+            <a:off x="2904698" y="1825625"/>
+            <a:ext cx="6382604" cy="4351338"/>
+          </a:xfrm>
+        </p:spPr>
+      </p:pic>
+    </p:spTree>
+    <p:extLst>
+      <p:ext uri="{BB962C8B-B14F-4D97-AF65-F5344CB8AC3E}">
+        <p14:creationId xmlns:p14="http://schemas.microsoft.com/office/powerpoint/2010/main" val="1417063330"/>
       </p:ext>
     </p:extLst>
   </p:cSld>
@@ -3440,7 +5102,10 @@
           <a:bodyPr/>
           <a:lstStyle/>
           <a:p>
-            <a:endParaRPr lang="en-US"/>
+            <a:r>
+              <a:rPr lang="en-US" b="1" dirty="0"/>
+              <a:t>Pilot 1 </a:t>
+            </a:r>
           </a:p>
         </p:txBody>
       </p:sp>
@@ -3473,7 +5138,7 @@
           <a:p>
             <a:r>
               <a:rPr lang="en-US" dirty="0"/>
-              <a:t>17 qualified subjects </a:t>
+              <a:t>34 qualified subjects </a:t>
             </a:r>
           </a:p>
           <a:p>
@@ -3569,19 +5234,17 @@
       </p:grpSpPr>
       <p:pic>
         <p:nvPicPr>
-          <p:cNvPr id="5" name="Content Placeholder 4">
-            <a:extLst>
-              <a:ext uri="{FF2B5EF4-FFF2-40B4-BE49-F238E27FC236}">
-                <a16:creationId xmlns:a16="http://schemas.microsoft.com/office/drawing/2014/main" id="{27B8ABF9-7530-661E-9151-79C9A9FCBA7B}"/>
+          <p:cNvPr id="6" name="Picture 5">
+            <a:extLst>
+              <a:ext uri="{FF2B5EF4-FFF2-40B4-BE49-F238E27FC236}">
+                <a16:creationId xmlns:a16="http://schemas.microsoft.com/office/drawing/2014/main" id="{A6098547-0EEA-CBF7-74DB-492A11E5FF5C}"/>
               </a:ext>
             </a:extLst>
           </p:cNvPr>
           <p:cNvPicPr>
-            <a:picLocks noGrp="1" noChangeAspect="1"/>
+            <a:picLocks noChangeAspect="1"/>
           </p:cNvPicPr>
-          <p:nvPr>
-            <p:ph idx="1"/>
-          </p:nvPr>
+          <p:nvPr/>
         </p:nvPicPr>
         <p:blipFill>
           <a:blip r:embed="rId2"/>
@@ -3591,9 +5254,12 @@
         </p:blipFill>
         <p:spPr>
           <a:xfrm>
-            <a:off x="1177858" y="1522666"/>
-            <a:ext cx="9525000" cy="4295775"/>
+            <a:off x="2066925" y="1295400"/>
+            <a:ext cx="8058150" cy="4267200"/>
           </a:xfrm>
+          <a:prstGeom prst="rect">
+            <a:avLst/>
+          </a:prstGeom>
         </p:spPr>
       </p:pic>
     </p:spTree>
@@ -3693,10 +5359,10 @@
       </p:sp>
       <p:pic>
         <p:nvPicPr>
-          <p:cNvPr id="5" name="Picture 4">
-            <a:extLst>
-              <a:ext uri="{FF2B5EF4-FFF2-40B4-BE49-F238E27FC236}">
-                <a16:creationId xmlns:a16="http://schemas.microsoft.com/office/drawing/2014/main" id="{B92E2EB9-30C4-CA1B-C535-9C47990A90F4}"/>
+          <p:cNvPr id="6" name="Picture 5">
+            <a:extLst>
+              <a:ext uri="{FF2B5EF4-FFF2-40B4-BE49-F238E27FC236}">
+                <a16:creationId xmlns:a16="http://schemas.microsoft.com/office/drawing/2014/main" id="{0DF308BF-8B59-463A-DD49-B889FE1B9D0E}"/>
               </a:ext>
             </a:extLst>
           </p:cNvPr>
@@ -3713,8 +5379,8 @@
         </p:blipFill>
         <p:spPr>
           <a:xfrm>
-            <a:off x="3728936" y="3125011"/>
-            <a:ext cx="4267200" cy="1600200"/>
+            <a:off x="4514850" y="2993180"/>
+            <a:ext cx="3162300" cy="1552575"/>
           </a:xfrm>
           <a:prstGeom prst="rect">
             <a:avLst/>
@@ -3795,13 +5461,13 @@
             <p:ph idx="1"/>
             <p:extLst>
               <p:ext uri="{D42A27DB-BD31-4B8C-83A1-F6EECF244321}">
-                <p14:modId xmlns:p14="http://schemas.microsoft.com/office/powerpoint/2010/main" val="749194840"/>
+                <p14:modId xmlns:p14="http://schemas.microsoft.com/office/powerpoint/2010/main" val="172471478"/>
               </p:ext>
             </p:extLst>
           </p:nvPr>
         </p:nvGraphicFramePr>
         <p:xfrm>
-          <a:off x="838200" y="1825625"/>
+          <a:off x="895350" y="1825625"/>
           <a:ext cx="10515600" cy="2595880"/>
         </p:xfrm>
         <a:graphic>
@@ -3950,7 +5616,7 @@
                     <a:p>
                       <a:r>
                         <a:rPr lang="en-US" dirty="0"/>
-                        <a:t>p = 0.00</a:t>
+                        <a:t>p = 0.004</a:t>
                       </a:r>
                     </a:p>
                   </a:txBody>
@@ -3963,7 +5629,7 @@
                     <a:p>
                       <a:r>
                         <a:rPr lang="en-US" dirty="0"/>
-                        <a:t>0.72</a:t>
+                        <a:t>0.67</a:t>
                       </a:r>
                     </a:p>
                   </a:txBody>
@@ -3976,7 +5642,7 @@
                     <a:p>
                       <a:r>
                         <a:rPr lang="en-US" dirty="0"/>
-                        <a:t>0.6</a:t>
+                        <a:t>0.61</a:t>
                       </a:r>
                     </a:p>
                   </a:txBody>
@@ -4022,7 +5688,7 @@
                     <a:p>
                       <a:r>
                         <a:rPr lang="en-US" dirty="0"/>
-                        <a:t>p = 0.033</a:t>
+                        <a:t>p = 0.053</a:t>
                       </a:r>
                     </a:p>
                   </a:txBody>
@@ -4035,7 +5701,7 @@
                     <a:p>
                       <a:r>
                         <a:rPr lang="en-US" dirty="0"/>
-                        <a:t>0.69</a:t>
+                        <a:t>0.66</a:t>
                       </a:r>
                     </a:p>
                   </a:txBody>
@@ -4310,7 +5976,7 @@
                     <a:p>
                       <a:r>
                         <a:rPr lang="en-US" dirty="0"/>
-                        <a:t>p = 0.392</a:t>
+                        <a:t>p = 0.75</a:t>
                       </a:r>
                     </a:p>
                   </a:txBody>
@@ -4336,7 +6002,7 @@
                     <a:p>
                       <a:r>
                         <a:rPr lang="en-US" dirty="0"/>
-                        <a:t>0.70</a:t>
+                        <a:t>0.66</a:t>
                       </a:r>
                     </a:p>
                   </a:txBody>
@@ -4417,43 +6083,461 @@
       </p:sp>
       <p:pic>
         <p:nvPicPr>
-          <p:cNvPr id="5" name="Content Placeholder 4" descr="Chart, bar chart, line chart&#10;&#10;Description automatically generated">
-            <a:extLst>
-              <a:ext uri="{FF2B5EF4-FFF2-40B4-BE49-F238E27FC236}">
-                <a16:creationId xmlns:a16="http://schemas.microsoft.com/office/drawing/2014/main" id="{BD8F7933-62A4-C265-9A94-E46B7677265D}"/>
+          <p:cNvPr id="7" name="Picture 6">
+            <a:extLst>
+              <a:ext uri="{FF2B5EF4-FFF2-40B4-BE49-F238E27FC236}">
+                <a16:creationId xmlns:a16="http://schemas.microsoft.com/office/drawing/2014/main" id="{C67F7E0A-2837-1348-2A4E-630A2D8B4C8A}"/>
               </a:ext>
             </a:extLst>
           </p:cNvPr>
           <p:cNvPicPr>
-            <a:picLocks noGrp="1" noChangeAspect="1"/>
+            <a:picLocks noChangeAspect="1"/>
           </p:cNvPicPr>
-          <p:nvPr>
-            <p:ph idx="1"/>
-          </p:nvPr>
+          <p:nvPr/>
         </p:nvPicPr>
         <p:blipFill>
-          <a:blip r:embed="rId2">
-            <a:extLst>
-              <a:ext uri="{28A0092B-C50C-407E-A947-70E740481C1C}">
-                <a14:useLocalDpi xmlns:a14="http://schemas.microsoft.com/office/drawing/2010/main" val="0"/>
-              </a:ext>
-            </a:extLst>
-          </a:blip>
+          <a:blip r:embed="rId3"/>
           <a:stretch>
             <a:fillRect/>
           </a:stretch>
         </p:blipFill>
         <p:spPr>
           <a:xfrm>
-            <a:off x="341050" y="1545916"/>
-            <a:ext cx="7283305" cy="4946959"/>
+            <a:off x="2190233" y="1312137"/>
+            <a:ext cx="7811533" cy="5325510"/>
           </a:xfrm>
+          <a:prstGeom prst="rect">
+            <a:avLst/>
+          </a:prstGeom>
+        </p:spPr>
+      </p:pic>
+      <p:cxnSp>
+        <p:nvCxnSpPr>
+          <p:cNvPr id="10" name="Straight Arrow Connector 9">
+            <a:extLst>
+              <a:ext uri="{FF2B5EF4-FFF2-40B4-BE49-F238E27FC236}">
+                <a16:creationId xmlns:a16="http://schemas.microsoft.com/office/drawing/2014/main" id="{379C5A2D-AF5A-5D30-472D-3C32FF98362B}"/>
+              </a:ext>
+            </a:extLst>
+          </p:cNvPr>
+          <p:cNvCxnSpPr/>
+          <p:nvPr/>
+        </p:nvCxnSpPr>
+        <p:spPr>
+          <a:xfrm flipV="1">
+            <a:off x="3317132" y="4114800"/>
+            <a:ext cx="311285" cy="252919"/>
+          </a:xfrm>
+          <a:prstGeom prst="straightConnector1">
+            <a:avLst/>
+          </a:prstGeom>
+          <a:ln>
+            <a:tailEnd type="triangle"/>
+          </a:ln>
+        </p:spPr>
+        <p:style>
+          <a:lnRef idx="2">
+            <a:schemeClr val="dk1"/>
+          </a:lnRef>
+          <a:fillRef idx="0">
+            <a:schemeClr val="dk1"/>
+          </a:fillRef>
+          <a:effectRef idx="1">
+            <a:schemeClr val="dk1"/>
+          </a:effectRef>
+          <a:fontRef idx="minor">
+            <a:schemeClr val="tx1"/>
+          </a:fontRef>
+        </p:style>
+      </p:cxnSp>
+      <p:cxnSp>
+        <p:nvCxnSpPr>
+          <p:cNvPr id="11" name="Straight Arrow Connector 10">
+            <a:extLst>
+              <a:ext uri="{FF2B5EF4-FFF2-40B4-BE49-F238E27FC236}">
+                <a16:creationId xmlns:a16="http://schemas.microsoft.com/office/drawing/2014/main" id="{9402F03B-06C3-7943-C701-0B6C1D2DA73B}"/>
+              </a:ext>
+            </a:extLst>
+          </p:cNvPr>
+          <p:cNvCxnSpPr/>
+          <p:nvPr/>
+        </p:nvCxnSpPr>
+        <p:spPr>
+          <a:xfrm flipV="1">
+            <a:off x="8063474" y="3838862"/>
+            <a:ext cx="311285" cy="252919"/>
+          </a:xfrm>
+          <a:prstGeom prst="straightConnector1">
+            <a:avLst/>
+          </a:prstGeom>
+          <a:ln>
+            <a:tailEnd type="triangle"/>
+          </a:ln>
+        </p:spPr>
+        <p:style>
+          <a:lnRef idx="2">
+            <a:schemeClr val="dk1"/>
+          </a:lnRef>
+          <a:fillRef idx="0">
+            <a:schemeClr val="dk1"/>
+          </a:fillRef>
+          <a:effectRef idx="1">
+            <a:schemeClr val="dk1"/>
+          </a:effectRef>
+          <a:fontRef idx="minor">
+            <a:schemeClr val="tx1"/>
+          </a:fontRef>
+        </p:style>
+      </p:cxnSp>
+      <p:cxnSp>
+        <p:nvCxnSpPr>
+          <p:cNvPr id="12" name="Straight Arrow Connector 11">
+            <a:extLst>
+              <a:ext uri="{FF2B5EF4-FFF2-40B4-BE49-F238E27FC236}">
+                <a16:creationId xmlns:a16="http://schemas.microsoft.com/office/drawing/2014/main" id="{AC572F3C-2A0B-6232-C6C3-EDECF5ECE59D}"/>
+              </a:ext>
+            </a:extLst>
+          </p:cNvPr>
+          <p:cNvCxnSpPr/>
+          <p:nvPr/>
+        </p:nvCxnSpPr>
+        <p:spPr>
+          <a:xfrm flipV="1">
+            <a:off x="6656962" y="3838862"/>
+            <a:ext cx="311285" cy="252919"/>
+          </a:xfrm>
+          <a:prstGeom prst="straightConnector1">
+            <a:avLst/>
+          </a:prstGeom>
+          <a:ln>
+            <a:tailEnd type="triangle"/>
+          </a:ln>
+        </p:spPr>
+        <p:style>
+          <a:lnRef idx="2">
+            <a:schemeClr val="dk1"/>
+          </a:lnRef>
+          <a:fillRef idx="0">
+            <a:schemeClr val="dk1"/>
+          </a:fillRef>
+          <a:effectRef idx="1">
+            <a:schemeClr val="dk1"/>
+          </a:effectRef>
+          <a:fontRef idx="minor">
+            <a:schemeClr val="tx1"/>
+          </a:fontRef>
+        </p:style>
+      </p:cxnSp>
+      <p:cxnSp>
+        <p:nvCxnSpPr>
+          <p:cNvPr id="13" name="Straight Arrow Connector 12">
+            <a:extLst>
+              <a:ext uri="{FF2B5EF4-FFF2-40B4-BE49-F238E27FC236}">
+                <a16:creationId xmlns:a16="http://schemas.microsoft.com/office/drawing/2014/main" id="{98486911-719A-187B-2D25-9AC4F65ED6CB}"/>
+              </a:ext>
+            </a:extLst>
+          </p:cNvPr>
+          <p:cNvCxnSpPr/>
+          <p:nvPr/>
+        </p:nvCxnSpPr>
+        <p:spPr>
+          <a:xfrm flipV="1">
+            <a:off x="8416912" y="3858317"/>
+            <a:ext cx="311285" cy="252919"/>
+          </a:xfrm>
+          <a:prstGeom prst="straightConnector1">
+            <a:avLst/>
+          </a:prstGeom>
+          <a:ln>
+            <a:tailEnd type="triangle"/>
+          </a:ln>
+        </p:spPr>
+        <p:style>
+          <a:lnRef idx="2">
+            <a:schemeClr val="dk1"/>
+          </a:lnRef>
+          <a:fillRef idx="0">
+            <a:schemeClr val="dk1"/>
+          </a:fillRef>
+          <a:effectRef idx="1">
+            <a:schemeClr val="dk1"/>
+          </a:effectRef>
+          <a:fontRef idx="minor">
+            <a:schemeClr val="tx1"/>
+          </a:fontRef>
+        </p:style>
+      </p:cxnSp>
+    </p:spTree>
+    <p:extLst>
+      <p:ext uri="{BB962C8B-B14F-4D97-AF65-F5344CB8AC3E}">
+        <p14:creationId xmlns:p14="http://schemas.microsoft.com/office/powerpoint/2010/main" val="3771519013"/>
+      </p:ext>
+    </p:extLst>
+  </p:cSld>
+  <p:clrMapOvr>
+    <a:masterClrMapping/>
+  </p:clrMapOvr>
+</p:sld>
+</file>
+
+<file path=ppt/slides/slide7.xml><?xml version="1.0" encoding="utf-8"?>
+<p:sld xmlns:a="http://schemas.openxmlformats.org/drawingml/2006/main" xmlns:r="http://schemas.openxmlformats.org/officeDocument/2006/relationships" xmlns:p="http://schemas.openxmlformats.org/presentationml/2006/main">
+  <p:cSld>
+    <p:spTree>
+      <p:nvGrpSpPr>
+        <p:cNvPr id="1" name=""/>
+        <p:cNvGrpSpPr/>
+        <p:nvPr/>
+      </p:nvGrpSpPr>
+      <p:grpSpPr>
+        <a:xfrm>
+          <a:off x="0" y="0"/>
+          <a:ext cx="0" cy="0"/>
+          <a:chOff x="0" y="0"/>
+          <a:chExt cx="0" cy="0"/>
+        </a:xfrm>
+      </p:grpSpPr>
+      <p:sp>
+        <p:nvSpPr>
+          <p:cNvPr id="2" name="Title 1">
+            <a:extLst>
+              <a:ext uri="{FF2B5EF4-FFF2-40B4-BE49-F238E27FC236}">
+                <a16:creationId xmlns:a16="http://schemas.microsoft.com/office/drawing/2014/main" id="{087F1BFB-821F-6652-96C2-76EAC8356DFE}"/>
+              </a:ext>
+            </a:extLst>
+          </p:cNvPr>
+          <p:cNvSpPr>
+            <a:spLocks noGrp="1"/>
+          </p:cNvSpPr>
+          <p:nvPr>
+            <p:ph type="title"/>
+          </p:nvPr>
+        </p:nvSpPr>
+        <p:spPr/>
+        <p:txBody>
+          <a:bodyPr/>
+          <a:lstStyle/>
+          <a:p>
+            <a:r>
+              <a:rPr lang="en-US" b="1" dirty="0"/>
+              <a:t>Pilot 2 </a:t>
+            </a:r>
+          </a:p>
+        </p:txBody>
+      </p:sp>
+      <p:sp>
+        <p:nvSpPr>
+          <p:cNvPr id="3" name="Content Placeholder 2">
+            <a:extLst>
+              <a:ext uri="{FF2B5EF4-FFF2-40B4-BE49-F238E27FC236}">
+                <a16:creationId xmlns:a16="http://schemas.microsoft.com/office/drawing/2014/main" id="{70D0296D-6B77-619E-478F-D08FAA8E1D00}"/>
+              </a:ext>
+            </a:extLst>
+          </p:cNvPr>
+          <p:cNvSpPr>
+            <a:spLocks noGrp="1"/>
+          </p:cNvSpPr>
+          <p:nvPr>
+            <p:ph idx="1"/>
+          </p:nvPr>
+        </p:nvSpPr>
+        <p:spPr/>
+        <p:txBody>
+          <a:bodyPr/>
+          <a:lstStyle/>
+          <a:p>
+            <a:r>
+              <a:rPr lang="en-US" dirty="0"/>
+              <a:t>58 total participants  </a:t>
+            </a:r>
+          </a:p>
+          <a:p>
+            <a:r>
+              <a:rPr lang="en-US" dirty="0"/>
+              <a:t>28 qualified participants</a:t>
+            </a:r>
+          </a:p>
+        </p:txBody>
+      </p:sp>
+    </p:spTree>
+    <p:extLst>
+      <p:ext uri="{BB962C8B-B14F-4D97-AF65-F5344CB8AC3E}">
+        <p14:creationId xmlns:p14="http://schemas.microsoft.com/office/powerpoint/2010/main" val="2581066565"/>
+      </p:ext>
+    </p:extLst>
+  </p:cSld>
+  <p:clrMapOvr>
+    <a:masterClrMapping/>
+  </p:clrMapOvr>
+</p:sld>
+</file>
+
+<file path=ppt/slides/slide8.xml><?xml version="1.0" encoding="utf-8"?>
+<p:sld xmlns:a="http://schemas.openxmlformats.org/drawingml/2006/main" xmlns:r="http://schemas.openxmlformats.org/officeDocument/2006/relationships" xmlns:p="http://schemas.openxmlformats.org/presentationml/2006/main">
+  <p:cSld>
+    <p:spTree>
+      <p:nvGrpSpPr>
+        <p:cNvPr id="1" name=""/>
+        <p:cNvGrpSpPr/>
+        <p:nvPr/>
+      </p:nvGrpSpPr>
+      <p:grpSpPr>
+        <a:xfrm>
+          <a:off x="0" y="0"/>
+          <a:ext cx="0" cy="0"/>
+          <a:chOff x="0" y="0"/>
+          <a:chExt cx="0" cy="0"/>
+        </a:xfrm>
+      </p:grpSpPr>
+      <p:sp>
+        <p:nvSpPr>
+          <p:cNvPr id="2" name="Title 1">
+            <a:extLst>
+              <a:ext uri="{FF2B5EF4-FFF2-40B4-BE49-F238E27FC236}">
+                <a16:creationId xmlns:a16="http://schemas.microsoft.com/office/drawing/2014/main" id="{9FA60D8B-658A-4537-9A6C-E74B2AAA37C8}"/>
+              </a:ext>
+            </a:extLst>
+          </p:cNvPr>
+          <p:cNvSpPr>
+            <a:spLocks noGrp="1"/>
+          </p:cNvSpPr>
+          <p:nvPr>
+            <p:ph type="title"/>
+          </p:nvPr>
+        </p:nvSpPr>
+        <p:spPr/>
+        <p:txBody>
+          <a:bodyPr/>
+          <a:lstStyle/>
+          <a:p>
+            <a:endParaRPr lang="en-US"/>
+          </a:p>
+        </p:txBody>
+      </p:sp>
+      <p:pic>
+        <p:nvPicPr>
+          <p:cNvPr id="5" name="Picture 4">
+            <a:extLst>
+              <a:ext uri="{FF2B5EF4-FFF2-40B4-BE49-F238E27FC236}">
+                <a16:creationId xmlns:a16="http://schemas.microsoft.com/office/drawing/2014/main" id="{F369F1FC-296C-C39C-8FC2-76A15461076D}"/>
+              </a:ext>
+            </a:extLst>
+          </p:cNvPr>
+          <p:cNvPicPr>
+            <a:picLocks noChangeAspect="1"/>
+          </p:cNvPicPr>
+          <p:nvPr/>
+        </p:nvPicPr>
+        <p:blipFill>
+          <a:blip r:embed="rId2"/>
+          <a:stretch>
+            <a:fillRect/>
+          </a:stretch>
+        </p:blipFill>
+        <p:spPr>
+          <a:xfrm>
+            <a:off x="152401" y="1891145"/>
+            <a:ext cx="8058150" cy="4267200"/>
+          </a:xfrm>
+          <a:prstGeom prst="rect">
+            <a:avLst/>
+          </a:prstGeom>
+        </p:spPr>
+      </p:pic>
+      <p:pic>
+        <p:nvPicPr>
+          <p:cNvPr id="7" name="Picture 6">
+            <a:extLst>
+              <a:ext uri="{FF2B5EF4-FFF2-40B4-BE49-F238E27FC236}">
+                <a16:creationId xmlns:a16="http://schemas.microsoft.com/office/drawing/2014/main" id="{DA6D3EB8-D7E0-FE55-3228-197AEE4E5299}"/>
+              </a:ext>
+            </a:extLst>
+          </p:cNvPr>
+          <p:cNvPicPr>
+            <a:picLocks noChangeAspect="1"/>
+          </p:cNvPicPr>
+          <p:nvPr/>
+        </p:nvPicPr>
+        <p:blipFill>
+          <a:blip r:embed="rId3"/>
+          <a:stretch>
+            <a:fillRect/>
+          </a:stretch>
+        </p:blipFill>
+        <p:spPr>
+          <a:xfrm>
+            <a:off x="8597177" y="4184071"/>
+            <a:ext cx="3343275" cy="1685925"/>
+          </a:xfrm>
+          <a:prstGeom prst="rect">
+            <a:avLst/>
+          </a:prstGeom>
         </p:spPr>
       </p:pic>
     </p:spTree>
     <p:extLst>
       <p:ext uri="{BB962C8B-B14F-4D97-AF65-F5344CB8AC3E}">
-        <p14:creationId xmlns:p14="http://schemas.microsoft.com/office/powerpoint/2010/main" val="3771519013"/>
+        <p14:creationId xmlns:p14="http://schemas.microsoft.com/office/powerpoint/2010/main" val="3060524515"/>
+      </p:ext>
+    </p:extLst>
+  </p:cSld>
+  <p:clrMapOvr>
+    <a:masterClrMapping/>
+  </p:clrMapOvr>
+</p:sld>
+</file>
+
+<file path=ppt/slides/slide9.xml><?xml version="1.0" encoding="utf-8"?>
+<p:sld xmlns:a="http://schemas.openxmlformats.org/drawingml/2006/main" xmlns:r="http://schemas.openxmlformats.org/officeDocument/2006/relationships" xmlns:p="http://schemas.openxmlformats.org/presentationml/2006/main">
+  <p:cSld>
+    <p:spTree>
+      <p:nvGrpSpPr>
+        <p:cNvPr id="1" name=""/>
+        <p:cNvGrpSpPr/>
+        <p:nvPr/>
+      </p:nvGrpSpPr>
+      <p:grpSpPr>
+        <a:xfrm>
+          <a:off x="0" y="0"/>
+          <a:ext cx="0" cy="0"/>
+          <a:chOff x="0" y="0"/>
+          <a:chExt cx="0" cy="0"/>
+        </a:xfrm>
+      </p:grpSpPr>
+      <p:pic>
+        <p:nvPicPr>
+          <p:cNvPr id="5" name="Picture 4">
+            <a:extLst>
+              <a:ext uri="{FF2B5EF4-FFF2-40B4-BE49-F238E27FC236}">
+                <a16:creationId xmlns:a16="http://schemas.microsoft.com/office/drawing/2014/main" id="{CCC44337-D4E6-4539-5AF3-F00EBD54D44E}"/>
+              </a:ext>
+            </a:extLst>
+          </p:cNvPr>
+          <p:cNvPicPr>
+            <a:picLocks noChangeAspect="1"/>
+          </p:cNvPicPr>
+          <p:nvPr/>
+        </p:nvPicPr>
+        <p:blipFill>
+          <a:blip r:embed="rId2"/>
+          <a:stretch>
+            <a:fillRect/>
+          </a:stretch>
+        </p:blipFill>
+        <p:spPr>
+          <a:xfrm>
+            <a:off x="1328379" y="178677"/>
+            <a:ext cx="9097419" cy="6202162"/>
+          </a:xfrm>
+          <a:prstGeom prst="rect">
+            <a:avLst/>
+          </a:prstGeom>
+        </p:spPr>
+      </p:pic>
+    </p:spTree>
+    <p:extLst>
+      <p:ext uri="{BB962C8B-B14F-4D97-AF65-F5344CB8AC3E}">
+        <p14:creationId xmlns:p14="http://schemas.microsoft.com/office/powerpoint/2010/main" val="2611660630"/>
       </p:ext>
     </p:extLst>
   </p:cSld>
@@ -4756,4 +6840,299 @@
     </a:ext>
   </a:extLst>
 </a:theme>
+</file>
+
+<file path=ppt/theme/theme2.xml><?xml version="1.0" encoding="utf-8"?>
+<a:theme xmlns:a="http://schemas.openxmlformats.org/drawingml/2006/main" name="Office Theme">
+  <a:themeElements>
+    <a:clrScheme name="Office">
+      <a:dk1>
+        <a:sysClr val="windowText" lastClr="000000"/>
+      </a:dk1>
+      <a:lt1>
+        <a:sysClr val="window" lastClr="FFFFFF"/>
+      </a:lt1>
+      <a:dk2>
+        <a:srgbClr val="44546A"/>
+      </a:dk2>
+      <a:lt2>
+        <a:srgbClr val="E7E6E6"/>
+      </a:lt2>
+      <a:accent1>
+        <a:srgbClr val="4472C4"/>
+      </a:accent1>
+      <a:accent2>
+        <a:srgbClr val="ED7D31"/>
+      </a:accent2>
+      <a:accent3>
+        <a:srgbClr val="A5A5A5"/>
+      </a:accent3>
+      <a:accent4>
+        <a:srgbClr val="FFC000"/>
+      </a:accent4>
+      <a:accent5>
+        <a:srgbClr val="5B9BD5"/>
+      </a:accent5>
+      <a:accent6>
+        <a:srgbClr val="70AD47"/>
+      </a:accent6>
+      <a:hlink>
+        <a:srgbClr val="0563C1"/>
+      </a:hlink>
+      <a:folHlink>
+        <a:srgbClr val="954F72"/>
+      </a:folHlink>
+    </a:clrScheme>
+    <a:fontScheme name="Office">
+      <a:majorFont>
+        <a:latin typeface="Calibri Light" panose="020F0302020204030204"/>
+        <a:ea typeface=""/>
+        <a:cs typeface=""/>
+        <a:font script="Jpan" typeface="游ゴシック Light"/>
+        <a:font script="Hang" typeface="맑은 고딕"/>
+        <a:font script="Hans" typeface="等线 Light"/>
+        <a:font script="Hant" typeface="新細明體"/>
+        <a:font script="Arab" typeface="Times New Roman"/>
+        <a:font script="Hebr" typeface="Times New Roman"/>
+        <a:font script="Thai" typeface="Angsana New"/>
+        <a:font script="Ethi" typeface="Nyala"/>
+        <a:font script="Beng" typeface="Vrinda"/>
+        <a:font script="Gujr" typeface="Shruti"/>
+        <a:font script="Khmr" typeface="MoolBoran"/>
+        <a:font script="Knda" typeface="Tunga"/>
+        <a:font script="Guru" typeface="Raavi"/>
+        <a:font script="Cans" typeface="Euphemia"/>
+        <a:font script="Cher" typeface="Plantagenet Cherokee"/>
+        <a:font script="Yiii" typeface="Microsoft Yi Baiti"/>
+        <a:font script="Tibt" typeface="Microsoft Himalaya"/>
+        <a:font script="Thaa" typeface="MV Boli"/>
+        <a:font script="Deva" typeface="Mangal"/>
+        <a:font script="Telu" typeface="Gautami"/>
+        <a:font script="Taml" typeface="Latha"/>
+        <a:font script="Syrc" typeface="Estrangelo Edessa"/>
+        <a:font script="Orya" typeface="Kalinga"/>
+        <a:font script="Mlym" typeface="Kartika"/>
+        <a:font script="Laoo" typeface="DokChampa"/>
+        <a:font script="Sinh" typeface="Iskoola Pota"/>
+        <a:font script="Mong" typeface="Mongolian Baiti"/>
+        <a:font script="Viet" typeface="Times New Roman"/>
+        <a:font script="Uigh" typeface="Microsoft Uighur"/>
+        <a:font script="Geor" typeface="Sylfaen"/>
+        <a:font script="Armn" typeface="Arial"/>
+        <a:font script="Bugi" typeface="Leelawadee UI"/>
+        <a:font script="Bopo" typeface="Microsoft JhengHei"/>
+        <a:font script="Java" typeface="Javanese Text"/>
+        <a:font script="Lisu" typeface="Segoe UI"/>
+        <a:font script="Mymr" typeface="Myanmar Text"/>
+        <a:font script="Nkoo" typeface="Ebrima"/>
+        <a:font script="Olck" typeface="Nirmala UI"/>
+        <a:font script="Osma" typeface="Ebrima"/>
+        <a:font script="Phag" typeface="Phagspa"/>
+        <a:font script="Syrn" typeface="Estrangelo Edessa"/>
+        <a:font script="Syrj" typeface="Estrangelo Edessa"/>
+        <a:font script="Syre" typeface="Estrangelo Edessa"/>
+        <a:font script="Sora" typeface="Nirmala UI"/>
+        <a:font script="Tale" typeface="Microsoft Tai Le"/>
+        <a:font script="Talu" typeface="Microsoft New Tai Lue"/>
+        <a:font script="Tfng" typeface="Ebrima"/>
+      </a:majorFont>
+      <a:minorFont>
+        <a:latin typeface="Calibri" panose="020F0502020204030204"/>
+        <a:ea typeface=""/>
+        <a:cs typeface=""/>
+        <a:font script="Jpan" typeface="游ゴシック"/>
+        <a:font script="Hang" typeface="맑은 고딕"/>
+        <a:font script="Hans" typeface="等线"/>
+        <a:font script="Hant" typeface="新細明體"/>
+        <a:font script="Arab" typeface="Arial"/>
+        <a:font script="Hebr" typeface="Arial"/>
+        <a:font script="Thai" typeface="Cordia New"/>
+        <a:font script="Ethi" typeface="Nyala"/>
+        <a:font script="Beng" typeface="Vrinda"/>
+        <a:font script="Gujr" typeface="Shruti"/>
+        <a:font script="Khmr" typeface="DaunPenh"/>
+        <a:font script="Knda" typeface="Tunga"/>
+        <a:font script="Guru" typeface="Raavi"/>
+        <a:font script="Cans" typeface="Euphemia"/>
+        <a:font script="Cher" typeface="Plantagenet Cherokee"/>
+        <a:font script="Yiii" typeface="Microsoft Yi Baiti"/>
+        <a:font script="Tibt" typeface="Microsoft Himalaya"/>
+        <a:font script="Thaa" typeface="MV Boli"/>
+        <a:font script="Deva" typeface="Mangal"/>
+        <a:font script="Telu" typeface="Gautami"/>
+        <a:font script="Taml" typeface="Latha"/>
+        <a:font script="Syrc" typeface="Estrangelo Edessa"/>
+        <a:font script="Orya" typeface="Kalinga"/>
+        <a:font script="Mlym" typeface="Kartika"/>
+        <a:font script="Laoo" typeface="DokChampa"/>
+        <a:font script="Sinh" typeface="Iskoola Pota"/>
+        <a:font script="Mong" typeface="Mongolian Baiti"/>
+        <a:font script="Viet" typeface="Arial"/>
+        <a:font script="Uigh" typeface="Microsoft Uighur"/>
+        <a:font script="Geor" typeface="Sylfaen"/>
+        <a:font script="Armn" typeface="Arial"/>
+        <a:font script="Bugi" typeface="Leelawadee UI"/>
+        <a:font script="Bopo" typeface="Microsoft JhengHei"/>
+        <a:font script="Java" typeface="Javanese Text"/>
+        <a:font script="Lisu" typeface="Segoe UI"/>
+        <a:font script="Mymr" typeface="Myanmar Text"/>
+        <a:font script="Nkoo" typeface="Ebrima"/>
+        <a:font script="Olck" typeface="Nirmala UI"/>
+        <a:font script="Osma" typeface="Ebrima"/>
+        <a:font script="Phag" typeface="Phagspa"/>
+        <a:font script="Syrn" typeface="Estrangelo Edessa"/>
+        <a:font script="Syrj" typeface="Estrangelo Edessa"/>
+        <a:font script="Syre" typeface="Estrangelo Edessa"/>
+        <a:font script="Sora" typeface="Nirmala UI"/>
+        <a:font script="Tale" typeface="Microsoft Tai Le"/>
+        <a:font script="Talu" typeface="Microsoft New Tai Lue"/>
+        <a:font script="Tfng" typeface="Ebrima"/>
+      </a:minorFont>
+    </a:fontScheme>
+    <a:fmtScheme name="Office">
+      <a:fillStyleLst>
+        <a:solidFill>
+          <a:schemeClr val="phClr"/>
+        </a:solidFill>
+        <a:gradFill rotWithShape="1">
+          <a:gsLst>
+            <a:gs pos="0">
+              <a:schemeClr val="phClr">
+                <a:lumMod val="110000"/>
+                <a:satMod val="105000"/>
+                <a:tint val="67000"/>
+              </a:schemeClr>
+            </a:gs>
+            <a:gs pos="50000">
+              <a:schemeClr val="phClr">
+                <a:lumMod val="105000"/>
+                <a:satMod val="103000"/>
+                <a:tint val="73000"/>
+              </a:schemeClr>
+            </a:gs>
+            <a:gs pos="100000">
+              <a:schemeClr val="phClr">
+                <a:lumMod val="105000"/>
+                <a:satMod val="109000"/>
+                <a:tint val="81000"/>
+              </a:schemeClr>
+            </a:gs>
+          </a:gsLst>
+          <a:lin ang="5400000" scaled="0"/>
+        </a:gradFill>
+        <a:gradFill rotWithShape="1">
+          <a:gsLst>
+            <a:gs pos="0">
+              <a:schemeClr val="phClr">
+                <a:satMod val="103000"/>
+                <a:lumMod val="102000"/>
+                <a:tint val="94000"/>
+              </a:schemeClr>
+            </a:gs>
+            <a:gs pos="50000">
+              <a:schemeClr val="phClr">
+                <a:satMod val="110000"/>
+                <a:lumMod val="100000"/>
+                <a:shade val="100000"/>
+              </a:schemeClr>
+            </a:gs>
+            <a:gs pos="100000">
+              <a:schemeClr val="phClr">
+                <a:lumMod val="99000"/>
+                <a:satMod val="120000"/>
+                <a:shade val="78000"/>
+              </a:schemeClr>
+            </a:gs>
+          </a:gsLst>
+          <a:lin ang="5400000" scaled="0"/>
+        </a:gradFill>
+      </a:fillStyleLst>
+      <a:lnStyleLst>
+        <a:ln w="6350" cap="flat" cmpd="sng" algn="ctr">
+          <a:solidFill>
+            <a:schemeClr val="phClr"/>
+          </a:solidFill>
+          <a:prstDash val="solid"/>
+          <a:miter lim="800000"/>
+        </a:ln>
+        <a:ln w="12700" cap="flat" cmpd="sng" algn="ctr">
+          <a:solidFill>
+            <a:schemeClr val="phClr"/>
+          </a:solidFill>
+          <a:prstDash val="solid"/>
+          <a:miter lim="800000"/>
+        </a:ln>
+        <a:ln w="19050" cap="flat" cmpd="sng" algn="ctr">
+          <a:solidFill>
+            <a:schemeClr val="phClr"/>
+          </a:solidFill>
+          <a:prstDash val="solid"/>
+          <a:miter lim="800000"/>
+        </a:ln>
+      </a:lnStyleLst>
+      <a:effectStyleLst>
+        <a:effectStyle>
+          <a:effectLst/>
+        </a:effectStyle>
+        <a:effectStyle>
+          <a:effectLst/>
+        </a:effectStyle>
+        <a:effectStyle>
+          <a:effectLst>
+            <a:outerShdw blurRad="57150" dist="19050" dir="5400000" algn="ctr" rotWithShape="0">
+              <a:srgbClr val="000000">
+                <a:alpha val="63000"/>
+              </a:srgbClr>
+            </a:outerShdw>
+          </a:effectLst>
+        </a:effectStyle>
+      </a:effectStyleLst>
+      <a:bgFillStyleLst>
+        <a:solidFill>
+          <a:schemeClr val="phClr"/>
+        </a:solidFill>
+        <a:solidFill>
+          <a:schemeClr val="phClr">
+            <a:tint val="95000"/>
+            <a:satMod val="170000"/>
+          </a:schemeClr>
+        </a:solidFill>
+        <a:gradFill rotWithShape="1">
+          <a:gsLst>
+            <a:gs pos="0">
+              <a:schemeClr val="phClr">
+                <a:tint val="93000"/>
+                <a:satMod val="150000"/>
+                <a:shade val="98000"/>
+                <a:lumMod val="102000"/>
+              </a:schemeClr>
+            </a:gs>
+            <a:gs pos="50000">
+              <a:schemeClr val="phClr">
+                <a:tint val="98000"/>
+                <a:satMod val="130000"/>
+                <a:shade val="90000"/>
+                <a:lumMod val="103000"/>
+              </a:schemeClr>
+            </a:gs>
+            <a:gs pos="100000">
+              <a:schemeClr val="phClr">
+                <a:shade val="63000"/>
+                <a:satMod val="120000"/>
+              </a:schemeClr>
+            </a:gs>
+          </a:gsLst>
+          <a:lin ang="5400000" scaled="0"/>
+        </a:gradFill>
+      </a:bgFillStyleLst>
+    </a:fmtScheme>
+  </a:themeElements>
+  <a:objectDefaults/>
+  <a:extraClrSchemeLst/>
+  <a:extLst>
+    <a:ext uri="{05A4C25C-085E-4340-85A3-A5531E510DB2}">
+      <thm15:themeFamily xmlns:thm15="http://schemas.microsoft.com/office/thememl/2012/main" name="Office Theme" id="{62F939B6-93AF-4DB8-9C6B-D6C7DFDC589F}" vid="{4A3C46E8-61CC-4603-A589-7422A47A8E4A}"/>
+    </a:ext>
+  </a:extLst>
+</a:theme>
 </file>
</xml_diff>